<commit_message>
final post with template finished and coding tide
</commit_message>
<xml_diff>
--- a/Poster Presentation Template_2020324.pptx
+++ b/Poster Presentation Template_2020324.pptx
@@ -277,7 +277,7 @@
             <a:fld id="{0158C5BC-9A70-462C-B28D-9600239EAC64}" type="datetimeFigureOut">
               <a:rPr lang="en-US" smtClean="0"/>
               <a:pPr/>
-              <a:t>11/23/2024</a:t>
+              <a:t>11/24/2024</a:t>
             </a:fld>
             <a:endParaRPr lang="en-US"/>
           </a:p>
@@ -444,7 +444,7 @@
             <a:fld id="{E6CC2317-6751-4CD4-9995-8782DD78E936}" type="datetimeFigureOut">
               <a:rPr lang="en-US" smtClean="0"/>
               <a:pPr/>
-              <a:t>11/23/2024</a:t>
+              <a:t>11/24/2024</a:t>
             </a:fld>
             <a:endParaRPr lang="en-US" dirty="0"/>
           </a:p>
@@ -14174,32 +14174,24 @@
         <p:spPr>
           <a:xfrm>
             <a:off x="491425" y="6378481"/>
-            <a:ext cx="10056813" cy="3416298"/>
+            <a:ext cx="10056813" cy="5355290"/>
           </a:xfrm>
         </p:spPr>
         <p:txBody>
           <a:bodyPr/>
           <a:lstStyle/>
           <a:p>
+            <a:pPr algn="just"/>
             <a:r>
-              <a:rPr lang="en-IE" sz="1800" kern="100" dirty="0">
+              <a:rPr lang="en-IE" sz="2400" kern="100" dirty="0">
                 <a:effectLst/>
                 <a:latin typeface="Arial" panose="020B0604020202020204" pitchFamily="34" charset="0"/>
                 <a:ea typeface="Aptos" panose="020B0004020202020204" pitchFamily="34" charset="0"/>
                 <a:cs typeface="Times New Roman" panose="02020603050405020304" pitchFamily="18" charset="0"/>
               </a:rPr>
-              <a:t>The main goal of working with a dataset is to maximise the potential of the data and potentially insert this information into AI and subsequently to ML. The research goal was to gather any data and transform it to something useful, for example, a resource to feed the AI. This is a powerful tool and needs accurate information. The process of inputting this information using AI is still new. Whereas, where there is human input into the data inputting process this can result in mistakes due to human error. Whereas, when using this process with AI, the chances of these mistakes being made are greatly lowered, if not eliminated completely. For instance, the current use of AI within the medical field to accurately perform surgical procedures. </a:t>
+              <a:t>The main goal of working with a dataset is to maximise the potential of the data and potentially insert this information into AI and subsequently to ML. The research goal was to gather any data and transform it to something useful, for example, a resource to feed the AI. This is a powerful tool and needs accurate information. The process of inputting this information using AI is still new. Whereas, where there is human input into the data inputting process this can result in mistakes due to human error. Whereas, when using this process with AI, the chances of these mistakes being made are greatly lowered, if not eliminated completely. For instance, the current use of AI within the medical field to accurately perform surgical procedures. The risk of accidents is significantly less than when being performed by a human surgeon. </a:t>
             </a:r>
-            <a:r>
-              <a:rPr lang="en-IE" sz="1800" kern="100">
-                <a:effectLst/>
-                <a:latin typeface="Arial" panose="020B0604020202020204" pitchFamily="34" charset="0"/>
-                <a:ea typeface="Aptos" panose="020B0004020202020204" pitchFamily="34" charset="0"/>
-                <a:cs typeface="Times New Roman" panose="02020603050405020304" pitchFamily="18" charset="0"/>
-              </a:rPr>
-              <a:t>The risk of accidents is significantly less than when being performed by a human surgeon. </a:t>
-            </a:r>
-            <a:endParaRPr lang="en-IE" sz="1800" kern="100">
+            <a:endParaRPr lang="en-IE" sz="2400" kern="100" dirty="0">
               <a:effectLst/>
               <a:latin typeface="Aptos" panose="020B0004020202020204" pitchFamily="34" charset="0"/>
               <a:ea typeface="Aptos" panose="020B0004020202020204" pitchFamily="34" charset="0"/>
@@ -14251,7 +14243,7 @@
         </p:nvSpPr>
         <p:spPr>
           <a:xfrm>
-            <a:off x="509578" y="18648837"/>
+            <a:off x="491425" y="18219121"/>
             <a:ext cx="10050462" cy="754045"/>
           </a:xfrm>
         </p:spPr>
@@ -14285,13 +14277,14 @@
         <p:spPr>
           <a:xfrm>
             <a:off x="11441111" y="6092185"/>
-            <a:ext cx="10048874" cy="3046966"/>
+            <a:ext cx="10048874" cy="2677634"/>
           </a:xfrm>
         </p:spPr>
         <p:txBody>
           <a:bodyPr/>
           <a:lstStyle/>
           <a:p>
+            <a:pPr algn="just"/>
             <a:r>
               <a:rPr lang="en-GB" sz="2400" dirty="0">
                 <a:solidFill>
@@ -14300,7 +14293,7 @@
                 <a:latin typeface="Arial" panose="020B0604020202020204" pitchFamily="34" charset="0"/>
                 <a:cs typeface="Arial" panose="020B0604020202020204" pitchFamily="34" charset="0"/>
               </a:rPr>
-              <a:t>The empirical research studies were based on an interpretative approach, which allowed for greater freedom to include personal views and interpretations, and to form knowledge inductively from views and experiences of participants. The diagram below characterises the research paradigm for this study, which can be described as a loose collection of logically related assumptions, concepts, or propositions that orient thinking and research (Bogdan and Biklen, 1998).</a:t>
+              <a:t>The research study were defined in a deterministic approach, which determines data  and transform all this information to a better comprehension. The main goal was to produce some input based on information that was given by client or patients but asking them for the permission to use this data to help the solve a problem which intrinsically supports all the experiment.</a:t>
             </a:r>
             <a:endParaRPr lang="en-US" sz="2400" dirty="0">
               <a:solidFill>
@@ -14380,7 +14373,7 @@
         </p:nvSpPr>
         <p:spPr>
           <a:xfrm>
-            <a:off x="33346443" y="21931197"/>
+            <a:off x="32940548" y="14289476"/>
             <a:ext cx="10047018" cy="677100"/>
           </a:xfrm>
         </p:spPr>
@@ -14413,7 +14406,7 @@
         </p:nvSpPr>
         <p:spPr>
           <a:xfrm>
-            <a:off x="33392567" y="28504101"/>
+            <a:off x="33069617" y="20665373"/>
             <a:ext cx="10047018" cy="754045"/>
           </a:xfrm>
         </p:spPr>
@@ -14504,7 +14497,7 @@
         </p:spPr>
         <p:txBody>
           <a:bodyPr>
-            <a:normAutofit fontScale="55000" lnSpcReduction="20000"/>
+            <a:normAutofit fontScale="77500" lnSpcReduction="20000"/>
           </a:bodyPr>
           <a:lstStyle/>
           <a:p>
@@ -14513,16 +14506,7 @@
                 <a:latin typeface="Arial" panose="020B0604020202020204" pitchFamily="34" charset="0"/>
                 <a:cs typeface="Arial" panose="020B0604020202020204" pitchFamily="34" charset="0"/>
               </a:rPr>
-              <a:t>Cultivating Academic Self-Efficacy through supportive social and self-regulated learning strategies </a:t>
-            </a:r>
-          </a:p>
-          <a:p>
-            <a:r>
-              <a:rPr lang="en-US" b="1" cap="small" dirty="0">
-                <a:latin typeface="Arial" panose="020B0604020202020204" pitchFamily="34" charset="0"/>
-                <a:cs typeface="Arial" panose="020B0604020202020204" pitchFamily="34" charset="0"/>
-              </a:rPr>
-              <a:t>for students in higher education</a:t>
+              <a:t>The use of exploratory data analysis (EDA) and Principal Component analysis(PCA) to maximize understanding of some information that was given</a:t>
             </a:r>
             <a:endParaRPr lang="en-IE" b="1" cap="small" dirty="0">
               <a:latin typeface="Arial" panose="020B0604020202020204" pitchFamily="34" charset="0"/>
@@ -14536,276 +14520,6 @@
           </a:p>
         </p:txBody>
       </p:sp>
-      <p:pic>
-        <p:nvPicPr>
-          <p:cNvPr id="20" name="Picture 19"/>
-          <p:cNvPicPr/>
-          <p:nvPr/>
-        </p:nvPicPr>
-        <p:blipFill>
-          <a:blip r:embed="rId3"/>
-          <a:stretch>
-            <a:fillRect/>
-          </a:stretch>
-        </p:blipFill>
-        <p:spPr>
-          <a:xfrm>
-            <a:off x="11564480" y="19170327"/>
-            <a:ext cx="9795691" cy="6370877"/>
-          </a:xfrm>
-          <a:prstGeom prst="rect">
-            <a:avLst/>
-          </a:prstGeom>
-          <a:ln w="12700">
-            <a:solidFill>
-              <a:schemeClr val="tx1"/>
-            </a:solidFill>
-          </a:ln>
-        </p:spPr>
-      </p:pic>
-      <p:pic>
-        <p:nvPicPr>
-          <p:cNvPr id="22" name="Picture 21"/>
-          <p:cNvPicPr/>
-          <p:nvPr/>
-        </p:nvPicPr>
-        <p:blipFill>
-          <a:blip r:embed="rId4"/>
-          <a:stretch>
-            <a:fillRect/>
-          </a:stretch>
-        </p:blipFill>
-        <p:spPr>
-          <a:xfrm>
-            <a:off x="11573593" y="9728372"/>
-            <a:ext cx="9795691" cy="7450859"/>
-          </a:xfrm>
-          <a:prstGeom prst="rect">
-            <a:avLst/>
-          </a:prstGeom>
-          <a:ln w="12700">
-            <a:solidFill>
-              <a:schemeClr val="tx1"/>
-            </a:solidFill>
-          </a:ln>
-        </p:spPr>
-      </p:pic>
-      <p:pic>
-        <p:nvPicPr>
-          <p:cNvPr id="4099" name="Picture 3"/>
-          <p:cNvPicPr>
-            <a:picLocks noChangeAspect="1" noChangeArrowheads="1"/>
-          </p:cNvPicPr>
-          <p:nvPr/>
-        </p:nvPicPr>
-        <p:blipFill>
-          <a:blip r:embed="rId5">
-            <a:extLst>
-              <a:ext uri="{28A0092B-C50C-407E-A947-70E740481C1C}">
-                <a14:useLocalDpi xmlns:a14="http://schemas.microsoft.com/office/drawing/2010/main" val="0"/>
-              </a:ext>
-            </a:extLst>
-          </a:blip>
-          <a:srcRect/>
-          <a:stretch>
-            <a:fillRect/>
-          </a:stretch>
-        </p:blipFill>
-        <p:spPr bwMode="auto">
-          <a:xfrm>
-            <a:off x="918274" y="23540279"/>
-            <a:ext cx="9197276" cy="8438364"/>
-          </a:xfrm>
-          <a:prstGeom prst="rect">
-            <a:avLst/>
-          </a:prstGeom>
-          <a:noFill/>
-          <a:ln>
-            <a:noFill/>
-          </a:ln>
-          <a:extLst>
-            <a:ext uri="{909E8E84-426E-40DD-AFC4-6F175D3DCCD1}">
-              <a14:hiddenFill xmlns:a14="http://schemas.microsoft.com/office/drawing/2010/main">
-                <a:solidFill>
-                  <a:schemeClr val="accent1"/>
-                </a:solidFill>
-              </a14:hiddenFill>
-            </a:ext>
-            <a:ext uri="{91240B29-F687-4F45-9708-019B960494DF}">
-              <a14:hiddenLine xmlns:a14="http://schemas.microsoft.com/office/drawing/2010/main" w="9525">
-                <a:solidFill>
-                  <a:schemeClr val="tx1"/>
-                </a:solidFill>
-                <a:miter lim="800000"/>
-                <a:headEnd/>
-                <a:tailEnd/>
-              </a14:hiddenLine>
-            </a:ext>
-          </a:extLst>
-        </p:spPr>
-      </p:pic>
-      <p:pic>
-        <p:nvPicPr>
-          <p:cNvPr id="4098" name="Picture 2"/>
-          <p:cNvPicPr>
-            <a:picLocks noChangeAspect="1" noChangeArrowheads="1"/>
-          </p:cNvPicPr>
-          <p:nvPr/>
-        </p:nvPicPr>
-        <p:blipFill>
-          <a:blip r:embed="rId6">
-            <a:extLst>
-              <a:ext uri="{28A0092B-C50C-407E-A947-70E740481C1C}">
-                <a14:useLocalDpi xmlns:a14="http://schemas.microsoft.com/office/drawing/2010/main" val="0"/>
-              </a:ext>
-            </a:extLst>
-          </a:blip>
-          <a:srcRect/>
-          <a:stretch>
-            <a:fillRect/>
-          </a:stretch>
-        </p:blipFill>
-        <p:spPr bwMode="auto">
-          <a:xfrm>
-            <a:off x="33408415" y="10820362"/>
-            <a:ext cx="9841664" cy="5223653"/>
-          </a:xfrm>
-          <a:prstGeom prst="rect">
-            <a:avLst/>
-          </a:prstGeom>
-          <a:noFill/>
-          <a:ln>
-            <a:noFill/>
-          </a:ln>
-          <a:extLst>
-            <a:ext uri="{909E8E84-426E-40DD-AFC4-6F175D3DCCD1}">
-              <a14:hiddenFill xmlns:a14="http://schemas.microsoft.com/office/drawing/2010/main">
-                <a:solidFill>
-                  <a:schemeClr val="accent1"/>
-                </a:solidFill>
-              </a14:hiddenFill>
-            </a:ext>
-            <a:ext uri="{91240B29-F687-4F45-9708-019B960494DF}">
-              <a14:hiddenLine xmlns:a14="http://schemas.microsoft.com/office/drawing/2010/main" w="9525">
-                <a:solidFill>
-                  <a:schemeClr val="tx1"/>
-                </a:solidFill>
-                <a:miter lim="800000"/>
-                <a:headEnd/>
-                <a:tailEnd/>
-              </a14:hiddenLine>
-            </a:ext>
-          </a:extLst>
-        </p:spPr>
-      </p:pic>
-      <p:pic>
-        <p:nvPicPr>
-          <p:cNvPr id="19" name="Picture 3"/>
-          <p:cNvPicPr>
-            <a:picLocks noChangeAspect="1" noChangeArrowheads="1"/>
-          </p:cNvPicPr>
-          <p:nvPr/>
-        </p:nvPicPr>
-        <p:blipFill>
-          <a:blip r:embed="rId7">
-            <a:extLst>
-              <a:ext uri="{28A0092B-C50C-407E-A947-70E740481C1C}">
-                <a14:useLocalDpi xmlns:a14="http://schemas.microsoft.com/office/drawing/2010/main" val="0"/>
-              </a:ext>
-            </a:extLst>
-          </a:blip>
-          <a:srcRect/>
-          <a:stretch>
-            <a:fillRect/>
-          </a:stretch>
-        </p:blipFill>
-        <p:spPr bwMode="auto">
-          <a:xfrm>
-            <a:off x="33392567" y="16426199"/>
-            <a:ext cx="9857512" cy="5248213"/>
-          </a:xfrm>
-          <a:prstGeom prst="rect">
-            <a:avLst/>
-          </a:prstGeom>
-          <a:noFill/>
-          <a:ln>
-            <a:noFill/>
-          </a:ln>
-          <a:extLst>
-            <a:ext uri="{909E8E84-426E-40DD-AFC4-6F175D3DCCD1}">
-              <a14:hiddenFill xmlns:a14="http://schemas.microsoft.com/office/drawing/2010/main">
-                <a:solidFill>
-                  <a:schemeClr val="accent1"/>
-                </a:solidFill>
-              </a14:hiddenFill>
-            </a:ext>
-            <a:ext uri="{91240B29-F687-4F45-9708-019B960494DF}">
-              <a14:hiddenLine xmlns:a14="http://schemas.microsoft.com/office/drawing/2010/main" w="9525">
-                <a:solidFill>
-                  <a:schemeClr val="tx1"/>
-                </a:solidFill>
-                <a:miter lim="800000"/>
-                <a:headEnd/>
-                <a:tailEnd/>
-              </a14:hiddenLine>
-            </a:ext>
-          </a:extLst>
-        </p:spPr>
-      </p:pic>
-      <p:pic>
-        <p:nvPicPr>
-          <p:cNvPr id="4100" name="Picture 4"/>
-          <p:cNvPicPr>
-            <a:picLocks noChangeAspect="1" noChangeArrowheads="1"/>
-          </p:cNvPicPr>
-          <p:nvPr/>
-        </p:nvPicPr>
-        <p:blipFill>
-          <a:blip r:embed="rId8">
-            <a:extLst>
-              <a:ext uri="{28A0092B-C50C-407E-A947-70E740481C1C}">
-                <a14:useLocalDpi xmlns:a14="http://schemas.microsoft.com/office/drawing/2010/main" val="0"/>
-              </a:ext>
-            </a:extLst>
-          </a:blip>
-          <a:srcRect/>
-          <a:stretch>
-            <a:fillRect/>
-          </a:stretch>
-        </p:blipFill>
-        <p:spPr bwMode="auto">
-          <a:xfrm>
-            <a:off x="22401443" y="17642446"/>
-            <a:ext cx="9965607" cy="7063141"/>
-          </a:xfrm>
-          <a:prstGeom prst="rect">
-            <a:avLst/>
-          </a:prstGeom>
-          <a:noFill/>
-          <a:ln>
-            <a:noFill/>
-          </a:ln>
-          <a:extLst>
-            <a:ext uri="{909E8E84-426E-40DD-AFC4-6F175D3DCCD1}">
-              <a14:hiddenFill xmlns:a14="http://schemas.microsoft.com/office/drawing/2010/main">
-                <a:solidFill>
-                  <a:schemeClr val="accent1"/>
-                </a:solidFill>
-              </a14:hiddenFill>
-            </a:ext>
-            <a:ext uri="{91240B29-F687-4F45-9708-019B960494DF}">
-              <a14:hiddenLine xmlns:a14="http://schemas.microsoft.com/office/drawing/2010/main" w="9525">
-                <a:solidFill>
-                  <a:schemeClr val="tx1"/>
-                </a:solidFill>
-                <a:miter lim="800000"/>
-                <a:headEnd/>
-                <a:tailEnd/>
-              </a14:hiddenLine>
-            </a:ext>
-          </a:extLst>
-        </p:spPr>
-      </p:pic>
       <p:sp>
         <p:nvSpPr>
           <p:cNvPr id="27" name="Text Placeholder 6"/>
@@ -14818,8 +14532,8 @@
         </p:nvSpPr>
         <p:spPr>
           <a:xfrm>
-            <a:off x="22414720" y="11807392"/>
-            <a:ext cx="10048874" cy="846363"/>
+            <a:off x="22568119" y="16756049"/>
+            <a:ext cx="10048874" cy="1569638"/>
           </a:xfrm>
         </p:spPr>
         <p:txBody>
@@ -14827,11 +14541,14 @@
           <a:lstStyle/>
           <a:p>
             <a:r>
-              <a:rPr lang="en-US" i="1" u="sng" dirty="0">
+              <a:rPr lang="en-US" sz="2400" dirty="0">
+                <a:solidFill>
+                  <a:schemeClr val="tx1"/>
+                </a:solidFill>
                 <a:latin typeface="Arial" panose="020B0604020202020204" pitchFamily="34" charset="0"/>
                 <a:cs typeface="Arial" panose="020B0604020202020204" pitchFamily="34" charset="0"/>
               </a:rPr>
-              <a:t>Student Engagement</a:t>
+              <a:t>The EDA  show some the outliers that was identified , another topic is the principal component  analysis for that matter we got the data that was used to do EDA and applied the PCA on it. </a:t>
             </a:r>
           </a:p>
         </p:txBody>
@@ -14891,7 +14608,7 @@
                 <a:latin typeface="Arial" panose="020B0604020202020204" pitchFamily="34" charset="0"/>
                 <a:cs typeface="Arial" panose="020B0604020202020204" pitchFamily="34" charset="0"/>
               </a:rPr>
-              <a:t>Social Learning (PBL and PAL activities)</a:t>
+              <a:t>Summarizing PCA</a:t>
             </a:r>
           </a:p>
         </p:txBody>
@@ -14909,23 +14626,33 @@
         <p:spPr>
           <a:xfrm>
             <a:off x="33371596" y="5536712"/>
-            <a:ext cx="10048874" cy="846363"/>
+            <a:ext cx="10048874" cy="1492694"/>
           </a:xfrm>
         </p:spPr>
         <p:txBody>
           <a:bodyPr/>
           <a:lstStyle/>
           <a:p>
+            <a:pPr algn="ctr"/>
             <a:r>
-              <a:rPr lang="en-US" i="1" u="sng" dirty="0">
+              <a:rPr lang="en-US" sz="3700" b="1" u="sng" dirty="0">
                 <a:solidFill>
                   <a:schemeClr val="tx2"/>
                 </a:solidFill>
                 <a:latin typeface="Arial" panose="020B0604020202020204" pitchFamily="34" charset="0"/>
                 <a:cs typeface="Arial" panose="020B0604020202020204" pitchFamily="34" charset="0"/>
               </a:rPr>
-              <a:t>Self Efficacy</a:t>
+              <a:t>FINDINGS</a:t>
             </a:r>
+          </a:p>
+          <a:p>
+            <a:endParaRPr lang="en-US" i="1" u="sng" dirty="0">
+              <a:solidFill>
+                <a:schemeClr val="tx2"/>
+              </a:solidFill>
+              <a:latin typeface="Arial" panose="020B0604020202020204" pitchFamily="34" charset="0"/>
+              <a:cs typeface="Arial" panose="020B0604020202020204" pitchFamily="34" charset="0"/>
+            </a:endParaRPr>
           </a:p>
         </p:txBody>
       </p:sp>
@@ -14941,31 +14668,25 @@
         </p:nvSpPr>
         <p:spPr>
           <a:xfrm>
-            <a:off x="33382622" y="6056596"/>
-            <a:ext cx="10052050" cy="4693570"/>
+            <a:off x="33382622" y="6637292"/>
+            <a:ext cx="10052050" cy="1938970"/>
           </a:xfrm>
         </p:spPr>
         <p:txBody>
           <a:bodyPr/>
           <a:lstStyle/>
           <a:p>
+            <a:pPr algn="just"/>
             <a:r>
-              <a:rPr lang="en-IE" dirty="0">
+              <a:rPr lang="en-US" sz="2400" dirty="0">
                 <a:solidFill>
                   <a:schemeClr val="tx1"/>
                 </a:solidFill>
                 <a:latin typeface="Arial" panose="020B0604020202020204" pitchFamily="34" charset="0"/>
                 <a:cs typeface="Arial" panose="020B0604020202020204" pitchFamily="34" charset="0"/>
               </a:rPr>
-              <a:t>Participants were provided a self-efficacy questionnaire, based on a approach suggested by Bandura (2006), to complete at the start and end of a semester. A social learning intervention was introduced to a treatment group, and the overall self-efficacy group score comparison revealed very little, other than a slight increase in the treatment group score.  However, a significant finding was found when comparing the final four questions measuring the perceived ability to work within a group. To illustrate this, the first figure below represents the start of semester self-efficacy group score for both groups, followed by the second figure representing the end of semester self-efficacy score reversal.</a:t>
+              <a:t>Some of the results of the mean, median and IQR for the principal component analysis is showing on the image below one the method used was to concatenate two vector after converting to a sting which is paste0.</a:t>
             </a:r>
-            <a:endParaRPr lang="en-US" dirty="0">
-              <a:solidFill>
-                <a:schemeClr val="tx1"/>
-              </a:solidFill>
-              <a:latin typeface="Arial" panose="020B0604020202020204" pitchFamily="34" charset="0"/>
-              <a:cs typeface="Arial" panose="020B0604020202020204" pitchFamily="34" charset="0"/>
-            </a:endParaRPr>
           </a:p>
         </p:txBody>
       </p:sp>
@@ -15128,7 +14849,7 @@
             </a:lvl9pPr>
           </a:lstStyle>
           <a:p>
-            <a:pPr marL="0" indent="0">
+            <a:pPr marL="0" indent="0" algn="just">
               <a:buNone/>
             </a:pPr>
             <a:r>
@@ -15136,7 +14857,24 @@
                 <a:latin typeface="Arial" panose="020B0604020202020204" pitchFamily="34" charset="0"/>
                 <a:cs typeface="Arial" panose="020B0604020202020204" pitchFamily="34" charset="0"/>
               </a:rPr>
-              <a:t>The conceptual framework below, was developed from Bandura’s (1986) Reciprocal Determinism model, in which Behaviour, Environmental Factors and Personal Factors were replaced with Self-Efficacy, Social Learning and Reflection, which became the basis for developing implementation strategies to enhance student engagement.</a:t>
+              <a:t>The concept for this framework below, </a:t>
+            </a:r>
+            <a:r>
+              <a:rPr lang="en-GB" sz="800" b="0" i="0" dirty="0">
+                <a:solidFill>
+                  <a:srgbClr val="E8E8E8"/>
+                </a:solidFill>
+                <a:effectLst/>
+                <a:latin typeface="Google Sans"/>
+              </a:rPr>
+              <a:t>A </a:t>
+            </a:r>
+            <a:r>
+              <a:rPr lang="en-GB" sz="2400" dirty="0">
+                <a:latin typeface="Arial" panose="020B0604020202020204" pitchFamily="34" charset="0"/>
+                <a:cs typeface="Arial" panose="020B0604020202020204" pitchFamily="34" charset="0"/>
+              </a:rPr>
+              <a:t> includes key concepts, variables, relationships, and assumptions that guide the academic inquiry. It establishes the theoretical underpinnings and provides a lens through which researchers can analyse and interpret data.</a:t>
             </a:r>
             <a:endParaRPr lang="en-IE" sz="2400" dirty="0">
               <a:latin typeface="Arial" panose="020B0604020202020204" pitchFamily="34" charset="0"/>
@@ -15352,13 +15090,31 @@
             </a:lvl9pPr>
           </a:lstStyle>
           <a:p>
-            <a:pPr marL="0" indent="0">
+            <a:pPr marL="0" indent="0" algn="just">
               <a:buNone/>
             </a:pPr>
             <a:r>
-              <a:rPr lang="en-IE" sz="2500" dirty="0"/>
-              <a:t>A reflective learning journal was provided to student participants in two of the action research studies, participants were asked to complete this journal on a weekly basis over the course of a semester.  There was mixed opinions on the use of the journal, with the majority questioning its usefulness.  Students were not convinced of the benefits of using the journal over a long period of time, and found the activity a burden in some cases.  Some viewed it as a piece of additional assessment that had no grade, furthering most to question the benefits.   While some positive benefits were noticed, careful consideration is required if using such a tool for a class cohort, some individuals seemed to adapt better to this type of journaling activity than others.   </a:t>
+              <a:rPr lang="en-IE" sz="2400" dirty="0">
+                <a:latin typeface="Arial" panose="020B0604020202020204" pitchFamily="34" charset="0"/>
+                <a:cs typeface="Arial" panose="020B0604020202020204" pitchFamily="34" charset="0"/>
+              </a:rPr>
+              <a:t>Some of the difficulties we face was first find something we have a passion to talk about , and we implementing the code some functionalities even some formulas to obtain  a certain result using the dataset that was challenging. The dataset was clean using the method </a:t>
             </a:r>
+            <a:r>
+              <a:rPr lang="en-IE" sz="2400" dirty="0" err="1">
+                <a:latin typeface="Arial" panose="020B0604020202020204" pitchFamily="34" charset="0"/>
+                <a:cs typeface="Arial" panose="020B0604020202020204" pitchFamily="34" charset="0"/>
+              </a:rPr>
+              <a:t>na.omit</a:t>
+            </a:r>
+            <a:r>
+              <a:rPr lang="en-IE" sz="2400" dirty="0">
+                <a:latin typeface="Arial" panose="020B0604020202020204" pitchFamily="34" charset="0"/>
+                <a:cs typeface="Arial" panose="020B0604020202020204" pitchFamily="34" charset="0"/>
+              </a:rPr>
+              <a:t> which goes through the data analysing the one with NA and removing them from the table because it’s a bad input to have on  your dataset mutate which consist in creating new variables for the data set. Another feature that we use was Interquartile range to help to clean and obtain some of the outliers that is shown on the graph below.</a:t>
+            </a:r>
+            <a:endParaRPr lang="en-IE" sz="2500" dirty="0"/>
           </a:p>
         </p:txBody>
       </p:sp>
@@ -15375,7 +15131,7 @@
         <p:spPr>
           <a:xfrm>
             <a:off x="22407466" y="25936012"/>
-            <a:ext cx="10052050" cy="6490985"/>
+            <a:ext cx="10052050" cy="1569638"/>
           </a:xfrm>
         </p:spPr>
         <p:txBody>
@@ -15383,117 +15139,15 @@
           <a:lstStyle/>
           <a:p>
             <a:r>
-              <a:rPr lang="en-IE" dirty="0">
+              <a:rPr lang="en-IE" sz="2400" dirty="0">
                 <a:solidFill>
                   <a:schemeClr val="tx1"/>
                 </a:solidFill>
                 <a:latin typeface="Arial" panose="020B0604020202020204" pitchFamily="34" charset="0"/>
                 <a:cs typeface="Arial" panose="020B0604020202020204" pitchFamily="34" charset="0"/>
               </a:rPr>
-              <a:t>Problem Based Learning (PBL) and Peer Assisted Learning (PAL) were introduced to a treatment group over the course of a semester.  The quotes below represent a small sample of the overall positive feedback the participants expressed in terms of their enjoyment in participating in groups when solving programming problems:</a:t>
+              <a:t>We have done the standard deviation formula and some other aspects that need to calculate, on image below shows the result of PC1,PC2, PC3 and PC4.</a:t>
             </a:r>
-          </a:p>
-          <a:p>
-            <a:endParaRPr lang="en-IE" dirty="0">
-              <a:solidFill>
-                <a:schemeClr val="tx1"/>
-              </a:solidFill>
-              <a:latin typeface="Arial" panose="020B0604020202020204" pitchFamily="34" charset="0"/>
-              <a:cs typeface="Arial" panose="020B0604020202020204" pitchFamily="34" charset="0"/>
-            </a:endParaRPr>
-          </a:p>
-          <a:p>
-            <a:r>
-              <a:rPr lang="en-IE" sz="1600" i="1" dirty="0">
-                <a:solidFill>
-                  <a:schemeClr val="tx1"/>
-                </a:solidFill>
-                <a:latin typeface="Arial" panose="020B0604020202020204" pitchFamily="34" charset="0"/>
-                <a:cs typeface="Arial" panose="020B0604020202020204" pitchFamily="34" charset="0"/>
-              </a:rPr>
-              <a:t>“I learned I can work in a group. Although I most of the times would rather work alone, working in a group does make problem solving a lot easier”.</a:t>
-            </a:r>
-          </a:p>
-          <a:p>
-            <a:endParaRPr lang="en-IE" sz="1600" i="1" dirty="0">
-              <a:solidFill>
-                <a:schemeClr val="tx1"/>
-              </a:solidFill>
-              <a:latin typeface="Arial" panose="020B0604020202020204" pitchFamily="34" charset="0"/>
-              <a:cs typeface="Arial" panose="020B0604020202020204" pitchFamily="34" charset="0"/>
-            </a:endParaRPr>
-          </a:p>
-          <a:p>
-            <a:r>
-              <a:rPr lang="en-IE" sz="1600" i="1" dirty="0">
-                <a:solidFill>
-                  <a:schemeClr val="tx1"/>
-                </a:solidFill>
-                <a:latin typeface="Arial" panose="020B0604020202020204" pitchFamily="34" charset="0"/>
-                <a:cs typeface="Arial" panose="020B0604020202020204" pitchFamily="34" charset="0"/>
-              </a:rPr>
-              <a:t>“I enjoy programming but I’m 100% aware that my planning skills are way better than my programming skills. I wish we had more opportunities like this one to practice”.</a:t>
-            </a:r>
-          </a:p>
-          <a:p>
-            <a:endParaRPr lang="en-IE" sz="1600" i="1" dirty="0">
-              <a:solidFill>
-                <a:schemeClr val="tx1"/>
-              </a:solidFill>
-              <a:latin typeface="Arial" panose="020B0604020202020204" pitchFamily="34" charset="0"/>
-              <a:cs typeface="Arial" panose="020B0604020202020204" pitchFamily="34" charset="0"/>
-            </a:endParaRPr>
-          </a:p>
-          <a:p>
-            <a:r>
-              <a:rPr lang="en-IE" sz="1600" i="1" dirty="0">
-                <a:solidFill>
-                  <a:schemeClr val="tx1"/>
-                </a:solidFill>
-                <a:latin typeface="Arial" panose="020B0604020202020204" pitchFamily="34" charset="0"/>
-                <a:cs typeface="Arial" panose="020B0604020202020204" pitchFamily="34" charset="0"/>
-              </a:rPr>
-              <a:t>“Really enjoyable as I am better working with people.  (I’m a really nervous person and individual evaluations makes me so nervous that I cannot concentrate)”.</a:t>
-            </a:r>
-          </a:p>
-          <a:p>
-            <a:endParaRPr lang="en-IE" sz="1600" i="1" dirty="0">
-              <a:solidFill>
-                <a:schemeClr val="tx1"/>
-              </a:solidFill>
-              <a:latin typeface="Arial" panose="020B0604020202020204" pitchFamily="34" charset="0"/>
-              <a:cs typeface="Arial" panose="020B0604020202020204" pitchFamily="34" charset="0"/>
-            </a:endParaRPr>
-          </a:p>
-          <a:p>
-            <a:r>
-              <a:rPr lang="en-IE" sz="1600" i="1" dirty="0">
-                <a:solidFill>
-                  <a:schemeClr val="tx1"/>
-                </a:solidFill>
-                <a:latin typeface="Arial" panose="020B0604020202020204" pitchFamily="34" charset="0"/>
-                <a:cs typeface="Arial" panose="020B0604020202020204" pitchFamily="34" charset="0"/>
-              </a:rPr>
-              <a:t>“These activities really makes more interaction among friends and for a given problem, we can solve it with many the best ways.  And need to be continued in the coming weeks”.</a:t>
-            </a:r>
-          </a:p>
-          <a:p>
-            <a:endParaRPr lang="en-IE" sz="1600" i="1" dirty="0">
-              <a:solidFill>
-                <a:schemeClr val="tx1"/>
-              </a:solidFill>
-              <a:latin typeface="Arial" panose="020B0604020202020204" pitchFamily="34" charset="0"/>
-              <a:cs typeface="Arial" panose="020B0604020202020204" pitchFamily="34" charset="0"/>
-            </a:endParaRPr>
-          </a:p>
-          <a:p>
-            <a:endParaRPr lang="en-IE" sz="1600" i="1" dirty="0">
-              <a:solidFill>
-                <a:schemeClr val="tx1"/>
-              </a:solidFill>
-              <a:latin typeface="Arial" panose="020B0604020202020204" pitchFamily="34" charset="0"/>
-              <a:cs typeface="Arial" panose="020B0604020202020204" pitchFamily="34" charset="0"/>
-            </a:endParaRPr>
           </a:p>
         </p:txBody>
       </p:sp>
@@ -15509,7 +15163,7 @@
         </p:nvSpPr>
         <p:spPr>
           <a:xfrm>
-            <a:off x="521484" y="12794208"/>
+            <a:off x="567333" y="11149567"/>
             <a:ext cx="10026754" cy="754045"/>
           </a:xfrm>
         </p:spPr>
@@ -15540,7 +15194,7 @@
         </p:nvSpPr>
         <p:spPr>
           <a:xfrm>
-            <a:off x="578634" y="13812808"/>
+            <a:off x="578634" y="11903020"/>
             <a:ext cx="9736942" cy="5276211"/>
           </a:xfrm>
           <a:prstGeom prst="rect">
@@ -15689,64 +15343,191 @@
             </a:lvl9pPr>
           </a:lstStyle>
           <a:p>
-            <a:pPr marL="0" indent="0" algn="just" defTabSz="895350">
-              <a:buFont typeface="Arial" pitchFamily="34" charset="0"/>
+            <a:pPr marL="0" indent="0" algn="just">
+              <a:lnSpc>
+                <a:spcPct val="107000"/>
+              </a:lnSpc>
+              <a:spcAft>
+                <a:spcPts val="800"/>
+              </a:spcAft>
               <a:buNone/>
             </a:pPr>
             <a:r>
-              <a:rPr lang="en-IE" sz="2400" dirty="0">
+              <a:rPr lang="en-IE" sz="2400" b="1" kern="100" dirty="0">
+                <a:effectLst/>
                 <a:latin typeface="Arial" panose="020B0604020202020204" pitchFamily="34" charset="0"/>
-                <a:cs typeface="Arial" panose="020B0604020202020204" pitchFamily="34" charset="0"/>
-              </a:rPr>
-              <a:t>The four  questions below represent the core focus of the entire study:</a:t>
-            </a:r>
-            <a:endParaRPr lang="en-IE" sz="2400" b="1" dirty="0">
-              <a:latin typeface="Arial" panose="020B0604020202020204" pitchFamily="34" charset="0"/>
-              <a:cs typeface="Arial" panose="020B0604020202020204" pitchFamily="34" charset="0"/>
-            </a:endParaRPr>
-          </a:p>
-          <a:p>
-            <a:pPr marL="0" indent="0" algn="just" defTabSz="895350">
-              <a:buFont typeface="Arial" pitchFamily="34" charset="0"/>
-              <a:buNone/>
-            </a:pPr>
-            <a:endParaRPr lang="en-IE" sz="2400" b="1" dirty="0">
-              <a:latin typeface="Arial" panose="020B0604020202020204" pitchFamily="34" charset="0"/>
-              <a:cs typeface="Arial" panose="020B0604020202020204" pitchFamily="34" charset="0"/>
-            </a:endParaRPr>
-          </a:p>
-          <a:p>
-            <a:pPr marL="0" indent="0" algn="just" defTabSz="895350">
-              <a:buFont typeface="Arial" pitchFamily="34" charset="0"/>
-              <a:buNone/>
-            </a:pPr>
-            <a:r>
-              <a:rPr lang="en-IE" sz="2400" b="1" dirty="0">
-                <a:latin typeface="Arial" panose="020B0604020202020204" pitchFamily="34" charset="0"/>
+                <a:ea typeface="Aptos" panose="020B0004020202020204" pitchFamily="34" charset="0"/>
                 <a:cs typeface="Arial" panose="020B0604020202020204" pitchFamily="34" charset="0"/>
               </a:rPr>
               <a:t>Q.1.</a:t>
             </a:r>
             <a:r>
-              <a:rPr lang="en-IE" sz="2400" dirty="0">
+              <a:rPr lang="en-IE" sz="2400" kern="100" dirty="0">
+                <a:effectLst/>
                 <a:latin typeface="Arial" panose="020B0604020202020204" pitchFamily="34" charset="0"/>
+                <a:ea typeface="Aptos" panose="020B0004020202020204" pitchFamily="34" charset="0"/>
                 <a:cs typeface="Arial" panose="020B0604020202020204" pitchFamily="34" charset="0"/>
               </a:rPr>
               <a:t> 	Is a </a:t>
             </a:r>
             <a:r>
-              <a:rPr lang="en-IE" sz="2400" b="1" dirty="0">
+              <a:rPr lang="en-IE" sz="2400" b="1" kern="100" dirty="0">
+                <a:effectLst/>
                 <a:latin typeface="Arial" panose="020B0604020202020204" pitchFamily="34" charset="0"/>
+                <a:ea typeface="Aptos" panose="020B0004020202020204" pitchFamily="34" charset="0"/>
                 <a:cs typeface="Arial" panose="020B0604020202020204" pitchFamily="34" charset="0"/>
               </a:rPr>
-              <a:t>Reflective Learning Journal </a:t>
+              <a:t>Data Exploration and Preparation </a:t>
             </a:r>
             <a:r>
-              <a:rPr lang="en-IE" sz="2400" dirty="0">
+              <a:rPr lang="en-IE" sz="2400" kern="100" dirty="0">
+                <a:effectLst/>
                 <a:latin typeface="Arial" panose="020B0604020202020204" pitchFamily="34" charset="0"/>
+                <a:ea typeface="Aptos" panose="020B0004020202020204" pitchFamily="34" charset="0"/>
                 <a:cs typeface="Arial" panose="020B0604020202020204" pitchFamily="34" charset="0"/>
               </a:rPr>
-              <a:t>a useful and effective tool 	for engaging students in computer programming?</a:t>
+              <a:t>a useful and effective tool for making the data more precise to demonstrate this to user?</a:t>
+            </a:r>
+          </a:p>
+          <a:p>
+            <a:pPr marL="0" indent="0" algn="just">
+              <a:lnSpc>
+                <a:spcPct val="107000"/>
+              </a:lnSpc>
+              <a:spcAft>
+                <a:spcPts val="800"/>
+              </a:spcAft>
+              <a:buNone/>
+            </a:pPr>
+            <a:r>
+              <a:rPr lang="en-IE" sz="2400" b="1" kern="100" dirty="0">
+                <a:effectLst/>
+                <a:latin typeface="Arial" panose="020B0604020202020204" pitchFamily="34" charset="0"/>
+                <a:ea typeface="Aptos" panose="020B0004020202020204" pitchFamily="34" charset="0"/>
+                <a:cs typeface="Arial" panose="020B0604020202020204" pitchFamily="34" charset="0"/>
+              </a:rPr>
+              <a:t>Q.2</a:t>
+            </a:r>
+            <a:r>
+              <a:rPr lang="en-IE" sz="2400" kern="100" dirty="0">
+                <a:effectLst/>
+                <a:latin typeface="Arial" panose="020B0604020202020204" pitchFamily="34" charset="0"/>
+                <a:ea typeface="Aptos" panose="020B0004020202020204" pitchFamily="34" charset="0"/>
+                <a:cs typeface="Arial" panose="020B0604020202020204" pitchFamily="34" charset="0"/>
+              </a:rPr>
+              <a:t>. 	Using those technologies such as DEP can enhance </a:t>
+            </a:r>
+            <a:r>
+              <a:rPr lang="en-IE" sz="2400" b="1" kern="100" dirty="0">
+                <a:effectLst/>
+                <a:latin typeface="Arial" panose="020B0604020202020204" pitchFamily="34" charset="0"/>
+                <a:ea typeface="Aptos" panose="020B0004020202020204" pitchFamily="34" charset="0"/>
+                <a:cs typeface="Arial" panose="020B0604020202020204" pitchFamily="34" charset="0"/>
+              </a:rPr>
+              <a:t>student 	engagement and learning curve</a:t>
+            </a:r>
+            <a:r>
+              <a:rPr lang="en-IE" sz="2400" kern="100" dirty="0">
+                <a:effectLst/>
+                <a:latin typeface="Arial" panose="020B0604020202020204" pitchFamily="34" charset="0"/>
+                <a:ea typeface="Aptos" panose="020B0004020202020204" pitchFamily="34" charset="0"/>
+                <a:cs typeface="Arial" panose="020B0604020202020204" pitchFamily="34" charset="0"/>
+              </a:rPr>
+              <a:t>?</a:t>
+            </a:r>
+          </a:p>
+          <a:p>
+            <a:pPr marL="0" indent="0" algn="just">
+              <a:lnSpc>
+                <a:spcPct val="107000"/>
+              </a:lnSpc>
+              <a:spcAft>
+                <a:spcPts val="800"/>
+              </a:spcAft>
+              <a:buNone/>
+            </a:pPr>
+            <a:r>
+              <a:rPr lang="en-IE" sz="2400" b="1" kern="100" dirty="0">
+                <a:effectLst/>
+                <a:latin typeface="Arial" panose="020B0604020202020204" pitchFamily="34" charset="0"/>
+                <a:ea typeface="Aptos" panose="020B0004020202020204" pitchFamily="34" charset="0"/>
+                <a:cs typeface="Arial" panose="020B0604020202020204" pitchFamily="34" charset="0"/>
+              </a:rPr>
+              <a:t>Q.3 	</a:t>
+            </a:r>
+            <a:r>
+              <a:rPr lang="en-IE" sz="2400" kern="100" dirty="0">
+                <a:effectLst/>
+                <a:latin typeface="Arial" panose="020B0604020202020204" pitchFamily="34" charset="0"/>
+                <a:ea typeface="Aptos" panose="020B0004020202020204" pitchFamily="34" charset="0"/>
+                <a:cs typeface="Arial" panose="020B0604020202020204" pitchFamily="34" charset="0"/>
+              </a:rPr>
+              <a:t>Are EDA and PCA techniques, such as </a:t>
+            </a:r>
+            <a:r>
+              <a:rPr lang="en-IE" sz="2400" b="1" kern="100" dirty="0">
+                <a:effectLst/>
+                <a:latin typeface="Arial" panose="020B0604020202020204" pitchFamily="34" charset="0"/>
+                <a:ea typeface="Aptos" panose="020B0004020202020204" pitchFamily="34" charset="0"/>
+                <a:cs typeface="Arial" panose="020B0604020202020204" pitchFamily="34" charset="0"/>
+              </a:rPr>
+              <a:t>Handle outliers using IQR and reduction of the data</a:t>
+            </a:r>
+            <a:r>
+              <a:rPr lang="en-IE" sz="2400" kern="100" dirty="0">
+                <a:effectLst/>
+                <a:latin typeface="Arial" panose="020B0604020202020204" pitchFamily="34" charset="0"/>
+                <a:ea typeface="Aptos" panose="020B0004020202020204" pitchFamily="34" charset="0"/>
+                <a:cs typeface="Arial" panose="020B0604020202020204" pitchFamily="34" charset="0"/>
+              </a:rPr>
+              <a:t>, Could they be powerful for illustrated the process of something to a person that has no knowledge in IT?</a:t>
+            </a:r>
+          </a:p>
+          <a:p>
+            <a:pPr marL="0" indent="0" algn="just">
+              <a:lnSpc>
+                <a:spcPct val="107000"/>
+              </a:lnSpc>
+              <a:spcAft>
+                <a:spcPts val="800"/>
+              </a:spcAft>
+              <a:buNone/>
+            </a:pPr>
+            <a:r>
+              <a:rPr lang="en-IE" sz="2400" b="1" kern="100" dirty="0">
+                <a:effectLst/>
+                <a:latin typeface="Aptos" panose="020B0004020202020204" pitchFamily="34" charset="0"/>
+                <a:ea typeface="Aptos" panose="020B0004020202020204" pitchFamily="34" charset="0"/>
+                <a:cs typeface="Times New Roman" panose="02020603050405020304" pitchFamily="18" charset="0"/>
+              </a:rPr>
+              <a:t>Q.4</a:t>
+            </a:r>
+            <a:r>
+              <a:rPr lang="en-IE" sz="2400" kern="100" dirty="0">
+                <a:effectLst/>
+                <a:latin typeface="Aptos" panose="020B0004020202020204" pitchFamily="34" charset="0"/>
+                <a:ea typeface="Aptos" panose="020B0004020202020204" pitchFamily="34" charset="0"/>
+                <a:cs typeface="Times New Roman" panose="02020603050405020304" pitchFamily="18" charset="0"/>
+              </a:rPr>
+              <a:t>	How can we use those strategies to enhance </a:t>
+            </a:r>
+            <a:r>
+              <a:rPr lang="en-IE" sz="2400" b="1" kern="100" dirty="0">
+                <a:effectLst/>
+                <a:latin typeface="Aptos" panose="020B0004020202020204" pitchFamily="34" charset="0"/>
+                <a:ea typeface="Aptos" panose="020B0004020202020204" pitchFamily="34" charset="0"/>
+                <a:cs typeface="Times New Roman" panose="02020603050405020304" pitchFamily="18" charset="0"/>
+              </a:rPr>
+              <a:t>data exploratory /principal component </a:t>
+            </a:r>
+            <a:r>
+              <a:rPr lang="en-IE" sz="2400" kern="100" dirty="0">
+                <a:effectLst/>
+                <a:latin typeface="Aptos" panose="020B0004020202020204" pitchFamily="34" charset="0"/>
+                <a:ea typeface="Aptos" panose="020B0004020202020204" pitchFamily="34" charset="0"/>
+                <a:cs typeface="Times New Roman" panose="02020603050405020304" pitchFamily="18" charset="0"/>
+              </a:rPr>
+              <a:t>in DEP  afterwards introduce this concept to AI and ML?</a:t>
             </a:r>
           </a:p>
           <a:p>
@@ -15754,102 +15535,10 @@
               <a:buFont typeface="Arial" pitchFamily="34" charset="0"/>
               <a:buNone/>
             </a:pPr>
-            <a:r>
-              <a:rPr lang="en-IE" sz="2400" b="1" dirty="0">
-                <a:latin typeface="Arial" panose="020B0604020202020204" pitchFamily="34" charset="0"/>
-                <a:cs typeface="Arial" panose="020B0604020202020204" pitchFamily="34" charset="0"/>
-              </a:rPr>
-              <a:t>Q.2</a:t>
-            </a:r>
-            <a:r>
-              <a:rPr lang="en-IE" sz="2400" dirty="0">
-                <a:latin typeface="Arial" panose="020B0604020202020204" pitchFamily="34" charset="0"/>
-                <a:cs typeface="Arial" panose="020B0604020202020204" pitchFamily="34" charset="0"/>
-              </a:rPr>
-              <a:t>. 	Can the use of social learning strategies enhance </a:t>
-            </a:r>
-            <a:r>
-              <a:rPr lang="en-IE" sz="2400" b="1" dirty="0">
-                <a:latin typeface="Arial" panose="020B0604020202020204" pitchFamily="34" charset="0"/>
-                <a:cs typeface="Arial" panose="020B0604020202020204" pitchFamily="34" charset="0"/>
-              </a:rPr>
-              <a:t>student 	engagement</a:t>
-            </a:r>
-            <a:r>
-              <a:rPr lang="en-IE" sz="2400" dirty="0">
-                <a:latin typeface="Arial" panose="020B0604020202020204" pitchFamily="34" charset="0"/>
-                <a:cs typeface="Arial" panose="020B0604020202020204" pitchFamily="34" charset="0"/>
-              </a:rPr>
-              <a:t>?</a:t>
-            </a:r>
-          </a:p>
-          <a:p>
-            <a:pPr marL="0" indent="0" algn="just" defTabSz="895350">
-              <a:buFont typeface="Arial" pitchFamily="34" charset="0"/>
-              <a:buNone/>
-            </a:pPr>
-            <a:r>
-              <a:rPr lang="en-IE" sz="2400" b="1" dirty="0">
-                <a:latin typeface="Arial" panose="020B0604020202020204" pitchFamily="34" charset="0"/>
-                <a:cs typeface="Arial" panose="020B0604020202020204" pitchFamily="34" charset="0"/>
-              </a:rPr>
-              <a:t>Q.3 	</a:t>
-            </a:r>
-            <a:r>
-              <a:rPr lang="en-IE" sz="2400" dirty="0">
-                <a:latin typeface="Arial" panose="020B0604020202020204" pitchFamily="34" charset="0"/>
-                <a:cs typeface="Arial" panose="020B0604020202020204" pitchFamily="34" charset="0"/>
-              </a:rPr>
-              <a:t>Are social learning strategies, such as </a:t>
-            </a:r>
-            <a:r>
-              <a:rPr lang="en-IE" sz="2400" b="1" dirty="0">
-                <a:latin typeface="Arial" panose="020B0604020202020204" pitchFamily="34" charset="0"/>
-                <a:cs typeface="Arial" panose="020B0604020202020204" pitchFamily="34" charset="0"/>
-              </a:rPr>
-              <a:t>Problem Based 	Learning and Peer Assisted Learning</a:t>
-            </a:r>
-            <a:r>
-              <a:rPr lang="en-IE" sz="2400" dirty="0">
-                <a:latin typeface="Arial" panose="020B0604020202020204" pitchFamily="34" charset="0"/>
-                <a:cs typeface="Arial" panose="020B0604020202020204" pitchFamily="34" charset="0"/>
-              </a:rPr>
-              <a:t>, effective tools in 	engaging students in computer 	programming?</a:t>
-            </a:r>
-          </a:p>
-          <a:p>
-            <a:pPr marL="0" indent="0" algn="just" defTabSz="895350">
-              <a:buFont typeface="Arial" pitchFamily="34" charset="0"/>
-              <a:buNone/>
-            </a:pPr>
-            <a:r>
-              <a:rPr lang="en-IE" sz="2400" b="1" dirty="0">
-                <a:latin typeface="Arial" panose="020B0604020202020204" pitchFamily="34" charset="0"/>
-                <a:cs typeface="Arial" panose="020B0604020202020204" pitchFamily="34" charset="0"/>
-              </a:rPr>
-              <a:t>Q.4</a:t>
-            </a:r>
-            <a:r>
-              <a:rPr lang="en-IE" sz="2400" dirty="0">
-                <a:latin typeface="Arial" panose="020B0604020202020204" pitchFamily="34" charset="0"/>
-                <a:cs typeface="Arial" panose="020B0604020202020204" pitchFamily="34" charset="0"/>
-              </a:rPr>
-              <a:t>	Can the use of social learning strategies enhance </a:t>
-            </a:r>
-            <a:r>
-              <a:rPr lang="en-IE" sz="2400" b="1" dirty="0">
-                <a:latin typeface="Arial" panose="020B0604020202020204" pitchFamily="34" charset="0"/>
-                <a:cs typeface="Arial" panose="020B0604020202020204" pitchFamily="34" charset="0"/>
-              </a:rPr>
-              <a:t>self-	efficacy </a:t>
-            </a:r>
-            <a:r>
-              <a:rPr lang="en-IE" sz="2400" dirty="0">
-                <a:latin typeface="Arial" panose="020B0604020202020204" pitchFamily="34" charset="0"/>
-                <a:cs typeface="Arial" panose="020B0604020202020204" pitchFamily="34" charset="0"/>
-              </a:rPr>
-              <a:t>in computer programming?</a:t>
-            </a:r>
+            <a:endParaRPr lang="en-IE" sz="2400" dirty="0">
+              <a:latin typeface="Arial" panose="020B0604020202020204" pitchFamily="34" charset="0"/>
+              <a:cs typeface="Arial" panose="020B0604020202020204" pitchFamily="34" charset="0"/>
+            </a:endParaRPr>
           </a:p>
         </p:txBody>
       </p:sp>
@@ -15863,8 +15552,8 @@
         </p:nvSpPr>
         <p:spPr>
           <a:xfrm>
-            <a:off x="33513137" y="22823005"/>
-            <a:ext cx="9736942" cy="5408649"/>
+            <a:off x="33656519" y="15555242"/>
+            <a:ext cx="9516432" cy="5408649"/>
           </a:xfrm>
           <a:prstGeom prst="rect">
             <a:avLst/>
@@ -16021,1998 +15710,23 @@
                 <a:latin typeface="Arial" panose="020B0604020202020204" pitchFamily="34" charset="0"/>
                 <a:cs typeface="Arial" panose="020B0604020202020204" pitchFamily="34" charset="0"/>
               </a:rPr>
-              <a:t>A summarised answer to the research questions are presented below:</a:t>
+              <a:t> We concluded that the EDA an PCA  are good features to evaluated data and give people a better understating for any subject , the process of obtaining data is the hard part to get because you need people permission. To use or to do any study with data obtained have to give a document for each individual one saying the give full consent to use the information. </a:t>
             </a:r>
           </a:p>
           <a:p>
             <a:pPr marL="0" indent="0" algn="just" defTabSz="895350">
-              <a:buFont typeface="Arial" pitchFamily="34" charset="0"/>
-              <a:buNone/>
-            </a:pPr>
-            <a:endParaRPr lang="en-IE" sz="1000" dirty="0">
-              <a:latin typeface="Arial" panose="020B0604020202020204" pitchFamily="34" charset="0"/>
-              <a:cs typeface="Arial" panose="020B0604020202020204" pitchFamily="34" charset="0"/>
-            </a:endParaRPr>
-          </a:p>
-          <a:p>
-            <a:pPr marL="0" indent="0" defTabSz="895350">
-              <a:buFont typeface="Arial" pitchFamily="34" charset="0"/>
               <a:buNone/>
             </a:pPr>
             <a:r>
-              <a:rPr lang="en-IE" sz="2200" b="1" dirty="0">
+              <a:rPr lang="en-IE" sz="2400" dirty="0">
                 <a:latin typeface="Arial" panose="020B0604020202020204" pitchFamily="34" charset="0"/>
                 <a:cs typeface="Arial" panose="020B0604020202020204" pitchFamily="34" charset="0"/>
               </a:rPr>
-              <a:t>Q.1.</a:t>
-            </a:r>
-            <a:r>
-              <a:rPr lang="en-IE" sz="2200" dirty="0">
-                <a:latin typeface="Arial" panose="020B0604020202020204" pitchFamily="34" charset="0"/>
-                <a:cs typeface="Arial" panose="020B0604020202020204" pitchFamily="34" charset="0"/>
-              </a:rPr>
-              <a:t> 	</a:t>
-            </a:r>
-            <a:r>
-              <a:rPr lang="en-IE" sz="2200" i="1" dirty="0">
-                <a:latin typeface="Arial" panose="020B0604020202020204" pitchFamily="34" charset="0"/>
-                <a:cs typeface="Arial" panose="020B0604020202020204" pitchFamily="34" charset="0"/>
-              </a:rPr>
-              <a:t>Both of the studies on the use of a reflective learning journal were 	mostly negative, in that students did not find it beneficial, and in some 	cases, saw it as an additional ungraded piece of assessment .</a:t>
-            </a:r>
-          </a:p>
-          <a:p>
-            <a:pPr marL="0" indent="0" defTabSz="895350">
-              <a:buFont typeface="Arial" pitchFamily="34" charset="0"/>
-              <a:buNone/>
-            </a:pPr>
-            <a:r>
-              <a:rPr lang="en-IE" sz="2200" b="1" dirty="0">
-                <a:latin typeface="Arial" panose="020B0604020202020204" pitchFamily="34" charset="0"/>
-                <a:cs typeface="Arial" panose="020B0604020202020204" pitchFamily="34" charset="0"/>
-              </a:rPr>
-              <a:t>Q.2. </a:t>
-            </a:r>
-            <a:r>
-              <a:rPr lang="en-IE" sz="2200" dirty="0">
-                <a:latin typeface="Arial" panose="020B0604020202020204" pitchFamily="34" charset="0"/>
-                <a:cs typeface="Arial" panose="020B0604020202020204" pitchFamily="34" charset="0"/>
-              </a:rPr>
-              <a:t>	There was </a:t>
-            </a:r>
-            <a:r>
-              <a:rPr lang="en-IE" sz="2200" i="1" dirty="0">
-                <a:latin typeface="Arial" panose="020B0604020202020204" pitchFamily="34" charset="0"/>
-                <a:cs typeface="Arial" panose="020B0604020202020204" pitchFamily="34" charset="0"/>
-              </a:rPr>
-              <a:t>evidence to suggest it does, specifically relating to 	group based activities, and communicating with peers.  However, it is 	difficult to say positive findings were directly linked to the social 	learning activities introduced over the semester.</a:t>
-            </a:r>
-            <a:endParaRPr lang="en-IE" sz="2200" dirty="0">
-              <a:latin typeface="Arial" panose="020B0604020202020204" pitchFamily="34" charset="0"/>
-              <a:cs typeface="Arial" panose="020B0604020202020204" pitchFamily="34" charset="0"/>
-            </a:endParaRPr>
-          </a:p>
-          <a:p>
-            <a:pPr marL="0" indent="0" defTabSz="895350">
-              <a:buFont typeface="Arial" pitchFamily="34" charset="0"/>
-              <a:buNone/>
-            </a:pPr>
-            <a:r>
-              <a:rPr lang="en-IE" sz="2200" b="1" dirty="0">
-                <a:latin typeface="Arial" panose="020B0604020202020204" pitchFamily="34" charset="0"/>
-                <a:cs typeface="Arial" panose="020B0604020202020204" pitchFamily="34" charset="0"/>
-              </a:rPr>
-              <a:t>Q.3 </a:t>
-            </a:r>
-            <a:r>
-              <a:rPr lang="en-IE" sz="2200" dirty="0">
-                <a:latin typeface="Arial" panose="020B0604020202020204" pitchFamily="34" charset="0"/>
-                <a:cs typeface="Arial" panose="020B0604020202020204" pitchFamily="34" charset="0"/>
-              </a:rPr>
-              <a:t>	</a:t>
-            </a:r>
-            <a:r>
-              <a:rPr lang="en-IE" sz="2200" i="1" dirty="0">
-                <a:latin typeface="Arial" panose="020B0604020202020204" pitchFamily="34" charset="0"/>
-                <a:cs typeface="Arial" panose="020B0604020202020204" pitchFamily="34" charset="0"/>
-              </a:rPr>
-              <a:t>The use of PBL and PAL was very successful in engaging students in 	computer programming, the students engaged in the activities and 	requested more of these activities in the future.</a:t>
-            </a:r>
-          </a:p>
-          <a:p>
-            <a:pPr marL="0" indent="0" defTabSz="895350">
-              <a:buFont typeface="Arial" pitchFamily="34" charset="0"/>
-              <a:buNone/>
-            </a:pPr>
-            <a:r>
-              <a:rPr lang="en-IE" sz="2200" b="1" dirty="0">
-                <a:latin typeface="Arial" panose="020B0604020202020204" pitchFamily="34" charset="0"/>
-                <a:cs typeface="Arial" panose="020B0604020202020204" pitchFamily="34" charset="0"/>
-              </a:rPr>
-              <a:t>Q.4</a:t>
-            </a:r>
-            <a:r>
-              <a:rPr lang="en-IE" sz="2200" dirty="0">
-                <a:latin typeface="Arial" panose="020B0604020202020204" pitchFamily="34" charset="0"/>
-                <a:cs typeface="Arial" panose="020B0604020202020204" pitchFamily="34" charset="0"/>
-              </a:rPr>
-              <a:t>	</a:t>
-            </a:r>
-            <a:r>
-              <a:rPr lang="en-IE" sz="2200" i="1" dirty="0">
-                <a:latin typeface="Arial" panose="020B0604020202020204" pitchFamily="34" charset="0"/>
-                <a:cs typeface="Arial" panose="020B0604020202020204" pitchFamily="34" charset="0"/>
-              </a:rPr>
-              <a:t>There was no strong evidence to suggest social learning improved 	self-efficacy in computer programming, however, there was strong 	evidence found that participating in group work enhances self-efficacy 	in working with others in group activities.</a:t>
+              <a:t>The advantage of studying this data is for later start to introduce this to AI which is a powerful tool and if used correctly can be one the best ally that you might have but that cannot be your resource to fix a problem.</a:t>
             </a:r>
           </a:p>
         </p:txBody>
       </p:sp>
-      <p:graphicFrame>
-        <p:nvGraphicFramePr>
-          <p:cNvPr id="37" name="Table 36"/>
-          <p:cNvGraphicFramePr>
-            <a:graphicFrameLocks noGrp="1"/>
-          </p:cNvGraphicFramePr>
-          <p:nvPr>
-            <p:extLst>
-              <p:ext uri="{D42A27DB-BD31-4B8C-83A1-F6EECF244321}">
-                <p14:modId xmlns:p14="http://schemas.microsoft.com/office/powerpoint/2010/main" val="3349645228"/>
-              </p:ext>
-            </p:extLst>
-          </p:nvPr>
-        </p:nvGraphicFramePr>
-        <p:xfrm>
-          <a:off x="11653912" y="26870112"/>
-          <a:ext cx="9742489" cy="5042448"/>
-        </p:xfrm>
-        <a:graphic>
-          <a:graphicData uri="http://schemas.openxmlformats.org/drawingml/2006/table">
-            <a:tbl>
-              <a:tblPr firstRow="1" firstCol="1" bandRow="1">
-                <a:tableStyleId>{5C22544A-7EE6-4342-B048-85BDC9FD1C3A}</a:tableStyleId>
-              </a:tblPr>
-              <a:tblGrid>
-                <a:gridCol w="7314070">
-                  <a:extLst>
-                    <a:ext uri="{9D8B030D-6E8A-4147-A177-3AD203B41FA5}">
-                      <a16:colId xmlns:a16="http://schemas.microsoft.com/office/drawing/2014/main" val="20000"/>
-                    </a:ext>
-                  </a:extLst>
-                </a:gridCol>
-                <a:gridCol w="1447800">
-                  <a:extLst>
-                    <a:ext uri="{9D8B030D-6E8A-4147-A177-3AD203B41FA5}">
-                      <a16:colId xmlns:a16="http://schemas.microsoft.com/office/drawing/2014/main" val="20001"/>
-                    </a:ext>
-                  </a:extLst>
-                </a:gridCol>
-                <a:gridCol w="980619">
-                  <a:extLst>
-                    <a:ext uri="{9D8B030D-6E8A-4147-A177-3AD203B41FA5}">
-                      <a16:colId xmlns:a16="http://schemas.microsoft.com/office/drawing/2014/main" val="20002"/>
-                    </a:ext>
-                  </a:extLst>
-                </a:gridCol>
-              </a:tblGrid>
-              <a:tr h="337853">
-                <a:tc gridSpan="3">
-                  <a:txBody>
-                    <a:bodyPr/>
-                    <a:lstStyle/>
-                    <a:p>
-                      <a:pPr>
-                        <a:spcAft>
-                          <a:spcPts val="0"/>
-                        </a:spcAft>
-                      </a:pPr>
-                      <a:endParaRPr lang="en-IE" sz="1000" dirty="0">
-                        <a:solidFill>
-                          <a:schemeClr val="tx1"/>
-                        </a:solidFill>
-                        <a:effectLst/>
-                        <a:latin typeface="Arial" panose="020B0604020202020204" pitchFamily="34" charset="0"/>
-                        <a:ea typeface="Times New Roman"/>
-                        <a:cs typeface="Arial" panose="020B0604020202020204" pitchFamily="34" charset="0"/>
-                      </a:endParaRPr>
-                    </a:p>
-                  </a:txBody>
-                  <a:tcPr marL="68580" marR="68580" marT="0" marB="0" anchor="ctr">
-                    <a:noFill/>
-                  </a:tcPr>
-                </a:tc>
-                <a:tc hMerge="1">
-                  <a:txBody>
-                    <a:bodyPr/>
-                    <a:lstStyle/>
-                    <a:p>
-                      <a:endParaRPr lang="en-IE"/>
-                    </a:p>
-                  </a:txBody>
-                  <a:tcPr/>
-                </a:tc>
-                <a:tc hMerge="1">
-                  <a:txBody>
-                    <a:bodyPr/>
-                    <a:lstStyle/>
-                    <a:p>
-                      <a:endParaRPr lang="en-IE"/>
-                    </a:p>
-                  </a:txBody>
-                  <a:tcPr/>
-                </a:tc>
-                <a:extLst>
-                  <a:ext uri="{0D108BD9-81ED-4DB2-BD59-A6C34878D82A}">
-                    <a16:rowId xmlns:a16="http://schemas.microsoft.com/office/drawing/2014/main" val="10000"/>
-                  </a:ext>
-                </a:extLst>
-              </a:tr>
-              <a:tr h="398339">
-                <a:tc>
-                  <a:txBody>
-                    <a:bodyPr/>
-                    <a:lstStyle/>
-                    <a:p>
-                      <a:pPr>
-                        <a:spcAft>
-                          <a:spcPts val="0"/>
-                        </a:spcAft>
-                      </a:pPr>
-                      <a:r>
-                        <a:rPr lang="en-IE" sz="1800" dirty="0">
-                          <a:solidFill>
-                            <a:schemeClr val="tx1"/>
-                          </a:solidFill>
-                          <a:effectLst/>
-                          <a:latin typeface="Arial" panose="020B0604020202020204" pitchFamily="34" charset="0"/>
-                          <a:ea typeface="Times New Roman"/>
-                          <a:cs typeface="Arial" panose="020B0604020202020204" pitchFamily="34" charset="0"/>
-                        </a:rPr>
-                        <a:t>Pilot Study -</a:t>
-                      </a:r>
-                      <a:r>
-                        <a:rPr lang="en-IE" sz="1800" baseline="0" dirty="0">
-                          <a:solidFill>
-                            <a:schemeClr val="tx1"/>
-                          </a:solidFill>
-                          <a:effectLst/>
-                          <a:latin typeface="Arial" panose="020B0604020202020204" pitchFamily="34" charset="0"/>
-                          <a:ea typeface="Times New Roman"/>
-                          <a:cs typeface="Arial" panose="020B0604020202020204" pitchFamily="34" charset="0"/>
-                        </a:rPr>
-                        <a:t> 2014</a:t>
-                      </a:r>
-                      <a:endParaRPr lang="en-IE" sz="1800" dirty="0">
-                        <a:solidFill>
-                          <a:schemeClr val="tx1"/>
-                        </a:solidFill>
-                        <a:effectLst/>
-                        <a:latin typeface="Arial" panose="020B0604020202020204" pitchFamily="34" charset="0"/>
-                        <a:ea typeface="Times New Roman"/>
-                        <a:cs typeface="Arial" panose="020B0604020202020204" pitchFamily="34" charset="0"/>
-                      </a:endParaRPr>
-                    </a:p>
-                  </a:txBody>
-                  <a:tcPr marL="68580" marR="68580" marT="0" marB="0" anchor="ctr">
-                    <a:solidFill>
-                      <a:schemeClr val="accent1"/>
-                    </a:solidFill>
-                  </a:tcPr>
-                </a:tc>
-                <a:tc>
-                  <a:txBody>
-                    <a:bodyPr/>
-                    <a:lstStyle/>
-                    <a:p>
-                      <a:pPr>
-                        <a:spcAft>
-                          <a:spcPts val="0"/>
-                        </a:spcAft>
-                      </a:pPr>
-                      <a:r>
-                        <a:rPr lang="en-GB" sz="1800" b="1" dirty="0">
-                          <a:solidFill>
-                            <a:schemeClr val="bg1"/>
-                          </a:solidFill>
-                          <a:effectLst/>
-                        </a:rPr>
-                        <a:t>Analysis</a:t>
-                      </a:r>
-                      <a:endParaRPr lang="en-IE" sz="1800" b="1" dirty="0">
-                        <a:solidFill>
-                          <a:schemeClr val="bg1"/>
-                        </a:solidFill>
-                        <a:effectLst/>
-                        <a:latin typeface="Times New Roman"/>
-                        <a:ea typeface="Times New Roman"/>
-                        <a:cs typeface="Times New Roman"/>
-                      </a:endParaRPr>
-                    </a:p>
-                  </a:txBody>
-                  <a:tcPr marL="68580" marR="68580" marT="0" marB="0" anchor="ctr">
-                    <a:solidFill>
-                      <a:schemeClr val="accent1"/>
-                    </a:solidFill>
-                  </a:tcPr>
-                </a:tc>
-                <a:tc>
-                  <a:txBody>
-                    <a:bodyPr/>
-                    <a:lstStyle/>
-                    <a:p>
-                      <a:pPr>
-                        <a:spcAft>
-                          <a:spcPts val="0"/>
-                        </a:spcAft>
-                      </a:pPr>
-                      <a:r>
-                        <a:rPr lang="en-GB" sz="1800" b="1" dirty="0">
-                          <a:solidFill>
-                            <a:schemeClr val="bg1"/>
-                          </a:solidFill>
-                          <a:effectLst/>
-                        </a:rPr>
-                        <a:t>Sample</a:t>
-                      </a:r>
-                      <a:endParaRPr lang="en-IE" sz="1800" b="1" dirty="0">
-                        <a:solidFill>
-                          <a:schemeClr val="bg1"/>
-                        </a:solidFill>
-                        <a:effectLst/>
-                        <a:latin typeface="Times New Roman"/>
-                        <a:ea typeface="Times New Roman"/>
-                        <a:cs typeface="Times New Roman"/>
-                      </a:endParaRPr>
-                    </a:p>
-                  </a:txBody>
-                  <a:tcPr marL="68580" marR="68580" marT="0" marB="0" anchor="ctr">
-                    <a:solidFill>
-                      <a:schemeClr val="accent1"/>
-                    </a:solidFill>
-                  </a:tcPr>
-                </a:tc>
-                <a:extLst>
-                  <a:ext uri="{0D108BD9-81ED-4DB2-BD59-A6C34878D82A}">
-                    <a16:rowId xmlns:a16="http://schemas.microsoft.com/office/drawing/2014/main" val="10001"/>
-                  </a:ext>
-                </a:extLst>
-              </a:tr>
-              <a:tr h="288187">
-                <a:tc>
-                  <a:txBody>
-                    <a:bodyPr/>
-                    <a:lstStyle/>
-                    <a:p>
-                      <a:pPr>
-                        <a:spcAft>
-                          <a:spcPts val="0"/>
-                        </a:spcAft>
-                      </a:pPr>
-                      <a:r>
-                        <a:rPr lang="en-GB" sz="1600" b="0" dirty="0">
-                          <a:solidFill>
-                            <a:schemeClr val="tx1"/>
-                          </a:solidFill>
-                          <a:effectLst/>
-                          <a:latin typeface="Arial" panose="020B0604020202020204" pitchFamily="34" charset="0"/>
-                          <a:cs typeface="Arial" panose="020B0604020202020204" pitchFamily="34" charset="0"/>
-                        </a:rPr>
-                        <a:t>Student study habits questionnaire</a:t>
-                      </a:r>
-                      <a:endParaRPr lang="en-IE" sz="1600" b="0" dirty="0">
-                        <a:solidFill>
-                          <a:schemeClr val="tx1"/>
-                        </a:solidFill>
-                        <a:effectLst/>
-                        <a:latin typeface="Arial" panose="020B0604020202020204" pitchFamily="34" charset="0"/>
-                        <a:ea typeface="Times New Roman"/>
-                        <a:cs typeface="Arial" panose="020B0604020202020204" pitchFamily="34" charset="0"/>
-                      </a:endParaRPr>
-                    </a:p>
-                  </a:txBody>
-                  <a:tcPr marL="68580" marR="68580" marT="0" marB="0" anchor="ctr">
-                    <a:solidFill>
-                      <a:schemeClr val="bg1">
-                        <a:lumMod val="85000"/>
-                      </a:schemeClr>
-                    </a:solidFill>
-                  </a:tcPr>
-                </a:tc>
-                <a:tc>
-                  <a:txBody>
-                    <a:bodyPr/>
-                    <a:lstStyle/>
-                    <a:p>
-                      <a:pPr>
-                        <a:spcAft>
-                          <a:spcPts val="0"/>
-                        </a:spcAft>
-                      </a:pPr>
-                      <a:r>
-                        <a:rPr lang="en-GB" sz="1600" b="0" dirty="0">
-                          <a:solidFill>
-                            <a:schemeClr val="tx1"/>
-                          </a:solidFill>
-                          <a:effectLst/>
-                          <a:latin typeface="Arial" panose="020B0604020202020204" pitchFamily="34" charset="0"/>
-                          <a:cs typeface="Arial" panose="020B0604020202020204" pitchFamily="34" charset="0"/>
-                        </a:rPr>
-                        <a:t>Quantitative</a:t>
-                      </a:r>
-                      <a:endParaRPr lang="en-IE" sz="1600" b="0" dirty="0">
-                        <a:solidFill>
-                          <a:schemeClr val="tx1"/>
-                        </a:solidFill>
-                        <a:effectLst/>
-                        <a:latin typeface="Arial" panose="020B0604020202020204" pitchFamily="34" charset="0"/>
-                        <a:ea typeface="Times New Roman"/>
-                        <a:cs typeface="Arial" panose="020B0604020202020204" pitchFamily="34" charset="0"/>
-                      </a:endParaRPr>
-                    </a:p>
-                  </a:txBody>
-                  <a:tcPr marL="68580" marR="68580" marT="0" marB="0" anchor="ctr">
-                    <a:solidFill>
-                      <a:schemeClr val="bg1">
-                        <a:lumMod val="85000"/>
-                      </a:schemeClr>
-                    </a:solidFill>
-                  </a:tcPr>
-                </a:tc>
-                <a:tc>
-                  <a:txBody>
-                    <a:bodyPr/>
-                    <a:lstStyle/>
-                    <a:p>
-                      <a:pPr algn="r">
-                        <a:spcAft>
-                          <a:spcPts val="0"/>
-                        </a:spcAft>
-                      </a:pPr>
-                      <a:r>
-                        <a:rPr lang="en-GB" sz="1600" b="0" dirty="0">
-                          <a:solidFill>
-                            <a:schemeClr val="tx1"/>
-                          </a:solidFill>
-                          <a:effectLst/>
-                          <a:latin typeface="Arial" panose="020B0604020202020204" pitchFamily="34" charset="0"/>
-                          <a:cs typeface="Arial" panose="020B0604020202020204" pitchFamily="34" charset="0"/>
-                        </a:rPr>
-                        <a:t>31</a:t>
-                      </a:r>
-                      <a:endParaRPr lang="en-IE" sz="1600" b="0" dirty="0">
-                        <a:solidFill>
-                          <a:schemeClr val="tx1"/>
-                        </a:solidFill>
-                        <a:effectLst/>
-                        <a:latin typeface="Arial" panose="020B0604020202020204" pitchFamily="34" charset="0"/>
-                        <a:ea typeface="Times New Roman"/>
-                        <a:cs typeface="Arial" panose="020B0604020202020204" pitchFamily="34" charset="0"/>
-                      </a:endParaRPr>
-                    </a:p>
-                  </a:txBody>
-                  <a:tcPr marL="68580" marR="68580" marT="0" marB="0">
-                    <a:solidFill>
-                      <a:schemeClr val="bg1">
-                        <a:lumMod val="85000"/>
-                      </a:schemeClr>
-                    </a:solidFill>
-                  </a:tcPr>
-                </a:tc>
-                <a:extLst>
-                  <a:ext uri="{0D108BD9-81ED-4DB2-BD59-A6C34878D82A}">
-                    <a16:rowId xmlns:a16="http://schemas.microsoft.com/office/drawing/2014/main" val="10002"/>
-                  </a:ext>
-                </a:extLst>
-              </a:tr>
-              <a:tr h="287383">
-                <a:tc>
-                  <a:txBody>
-                    <a:bodyPr/>
-                    <a:lstStyle/>
-                    <a:p>
-                      <a:pPr>
-                        <a:spcAft>
-                          <a:spcPts val="0"/>
-                        </a:spcAft>
-                      </a:pPr>
-                      <a:r>
-                        <a:rPr lang="en-GB" sz="1600" b="0" dirty="0">
-                          <a:solidFill>
-                            <a:schemeClr val="tx1"/>
-                          </a:solidFill>
-                          <a:effectLst/>
-                          <a:latin typeface="Arial" panose="020B0604020202020204" pitchFamily="34" charset="0"/>
-                          <a:cs typeface="Arial" panose="020B0604020202020204" pitchFamily="34" charset="0"/>
-                        </a:rPr>
-                        <a:t>Reflective Learning Journal</a:t>
-                      </a:r>
-                      <a:endParaRPr lang="en-IE" sz="1600" b="0" dirty="0">
-                        <a:solidFill>
-                          <a:schemeClr val="tx1"/>
-                        </a:solidFill>
-                        <a:effectLst/>
-                        <a:latin typeface="Arial" panose="020B0604020202020204" pitchFamily="34" charset="0"/>
-                        <a:ea typeface="Times New Roman"/>
-                        <a:cs typeface="Arial" panose="020B0604020202020204" pitchFamily="34" charset="0"/>
-                      </a:endParaRPr>
-                    </a:p>
-                  </a:txBody>
-                  <a:tcPr marL="68580" marR="68580" marT="0" marB="0" anchor="ctr">
-                    <a:solidFill>
-                      <a:schemeClr val="bg1">
-                        <a:lumMod val="85000"/>
-                      </a:schemeClr>
-                    </a:solidFill>
-                  </a:tcPr>
-                </a:tc>
-                <a:tc>
-                  <a:txBody>
-                    <a:bodyPr/>
-                    <a:lstStyle/>
-                    <a:p>
-                      <a:pPr>
-                        <a:spcAft>
-                          <a:spcPts val="0"/>
-                        </a:spcAft>
-                      </a:pPr>
-                      <a:r>
-                        <a:rPr lang="en-GB" sz="1600" b="0" dirty="0">
-                          <a:solidFill>
-                            <a:schemeClr val="tx1"/>
-                          </a:solidFill>
-                          <a:effectLst/>
-                          <a:latin typeface="Arial" panose="020B0604020202020204" pitchFamily="34" charset="0"/>
-                          <a:cs typeface="Arial" panose="020B0604020202020204" pitchFamily="34" charset="0"/>
-                        </a:rPr>
-                        <a:t>Qualitative</a:t>
-                      </a:r>
-                      <a:endParaRPr lang="en-IE" sz="1600" b="0" dirty="0">
-                        <a:solidFill>
-                          <a:schemeClr val="tx1"/>
-                        </a:solidFill>
-                        <a:effectLst/>
-                        <a:latin typeface="Arial" panose="020B0604020202020204" pitchFamily="34" charset="0"/>
-                        <a:ea typeface="Times New Roman"/>
-                        <a:cs typeface="Arial" panose="020B0604020202020204" pitchFamily="34" charset="0"/>
-                      </a:endParaRPr>
-                    </a:p>
-                  </a:txBody>
-                  <a:tcPr marL="68580" marR="68580" marT="0" marB="0" anchor="ctr">
-                    <a:solidFill>
-                      <a:schemeClr val="bg1">
-                        <a:lumMod val="85000"/>
-                      </a:schemeClr>
-                    </a:solidFill>
-                  </a:tcPr>
-                </a:tc>
-                <a:tc>
-                  <a:txBody>
-                    <a:bodyPr/>
-                    <a:lstStyle/>
-                    <a:p>
-                      <a:pPr algn="r">
-                        <a:spcAft>
-                          <a:spcPts val="0"/>
-                        </a:spcAft>
-                      </a:pPr>
-                      <a:r>
-                        <a:rPr lang="en-GB" sz="1600" b="0" dirty="0">
-                          <a:solidFill>
-                            <a:schemeClr val="tx1"/>
-                          </a:solidFill>
-                          <a:effectLst/>
-                          <a:latin typeface="Arial" panose="020B0604020202020204" pitchFamily="34" charset="0"/>
-                          <a:cs typeface="Arial" panose="020B0604020202020204" pitchFamily="34" charset="0"/>
-                        </a:rPr>
-                        <a:t>77</a:t>
-                      </a:r>
-                      <a:endParaRPr lang="en-IE" sz="1600" b="0" dirty="0">
-                        <a:solidFill>
-                          <a:schemeClr val="tx1"/>
-                        </a:solidFill>
-                        <a:effectLst/>
-                        <a:latin typeface="Arial" panose="020B0604020202020204" pitchFamily="34" charset="0"/>
-                        <a:ea typeface="Times New Roman"/>
-                        <a:cs typeface="Arial" panose="020B0604020202020204" pitchFamily="34" charset="0"/>
-                      </a:endParaRPr>
-                    </a:p>
-                  </a:txBody>
-                  <a:tcPr marL="68580" marR="68580" marT="0" marB="0">
-                    <a:solidFill>
-                      <a:schemeClr val="bg1">
-                        <a:lumMod val="85000"/>
-                      </a:schemeClr>
-                    </a:solidFill>
-                  </a:tcPr>
-                </a:tc>
-                <a:extLst>
-                  <a:ext uri="{0D108BD9-81ED-4DB2-BD59-A6C34878D82A}">
-                    <a16:rowId xmlns:a16="http://schemas.microsoft.com/office/drawing/2014/main" val="10003"/>
-                  </a:ext>
-                </a:extLst>
-              </a:tr>
-              <a:tr h="300446">
-                <a:tc>
-                  <a:txBody>
-                    <a:bodyPr/>
-                    <a:lstStyle/>
-                    <a:p>
-                      <a:pPr>
-                        <a:spcAft>
-                          <a:spcPts val="0"/>
-                        </a:spcAft>
-                      </a:pPr>
-                      <a:r>
-                        <a:rPr lang="en-GB" sz="1600" b="0" dirty="0">
-                          <a:solidFill>
-                            <a:schemeClr val="tx1"/>
-                          </a:solidFill>
-                          <a:effectLst/>
-                          <a:latin typeface="Arial" panose="020B0604020202020204" pitchFamily="34" charset="0"/>
-                          <a:cs typeface="Arial" panose="020B0604020202020204" pitchFamily="34" charset="0"/>
-                        </a:rPr>
-                        <a:t>Focus group (reflective journal evaluation)</a:t>
-                      </a:r>
-                      <a:endParaRPr lang="en-IE" sz="1600" b="0" dirty="0">
-                        <a:solidFill>
-                          <a:schemeClr val="tx1"/>
-                        </a:solidFill>
-                        <a:effectLst/>
-                        <a:latin typeface="Arial" panose="020B0604020202020204" pitchFamily="34" charset="0"/>
-                        <a:ea typeface="Times New Roman"/>
-                        <a:cs typeface="Arial" panose="020B0604020202020204" pitchFamily="34" charset="0"/>
-                      </a:endParaRPr>
-                    </a:p>
-                  </a:txBody>
-                  <a:tcPr marL="68580" marR="68580" marT="0" marB="0" anchor="ctr">
-                    <a:solidFill>
-                      <a:schemeClr val="bg1">
-                        <a:lumMod val="85000"/>
-                      </a:schemeClr>
-                    </a:solidFill>
-                  </a:tcPr>
-                </a:tc>
-                <a:tc>
-                  <a:txBody>
-                    <a:bodyPr/>
-                    <a:lstStyle/>
-                    <a:p>
-                      <a:pPr>
-                        <a:spcAft>
-                          <a:spcPts val="0"/>
-                        </a:spcAft>
-                      </a:pPr>
-                      <a:r>
-                        <a:rPr lang="en-GB" sz="1600" b="0" dirty="0">
-                          <a:solidFill>
-                            <a:schemeClr val="tx1"/>
-                          </a:solidFill>
-                          <a:effectLst/>
-                          <a:latin typeface="Arial" panose="020B0604020202020204" pitchFamily="34" charset="0"/>
-                          <a:cs typeface="Arial" panose="020B0604020202020204" pitchFamily="34" charset="0"/>
-                        </a:rPr>
-                        <a:t>Qualitative</a:t>
-                      </a:r>
-                      <a:endParaRPr lang="en-IE" sz="1600" b="0" dirty="0">
-                        <a:solidFill>
-                          <a:schemeClr val="tx1"/>
-                        </a:solidFill>
-                        <a:effectLst/>
-                        <a:latin typeface="Arial" panose="020B0604020202020204" pitchFamily="34" charset="0"/>
-                        <a:ea typeface="Times New Roman"/>
-                        <a:cs typeface="Arial" panose="020B0604020202020204" pitchFamily="34" charset="0"/>
-                      </a:endParaRPr>
-                    </a:p>
-                  </a:txBody>
-                  <a:tcPr marL="68580" marR="68580" marT="0" marB="0" anchor="ctr">
-                    <a:solidFill>
-                      <a:schemeClr val="bg1">
-                        <a:lumMod val="85000"/>
-                      </a:schemeClr>
-                    </a:solidFill>
-                  </a:tcPr>
-                </a:tc>
-                <a:tc>
-                  <a:txBody>
-                    <a:bodyPr/>
-                    <a:lstStyle/>
-                    <a:p>
-                      <a:pPr algn="r">
-                        <a:spcAft>
-                          <a:spcPts val="0"/>
-                        </a:spcAft>
-                      </a:pPr>
-                      <a:r>
-                        <a:rPr lang="en-GB" sz="1600" b="0" dirty="0">
-                          <a:solidFill>
-                            <a:schemeClr val="tx1"/>
-                          </a:solidFill>
-                          <a:effectLst/>
-                          <a:latin typeface="Arial" panose="020B0604020202020204" pitchFamily="34" charset="0"/>
-                          <a:cs typeface="Arial" panose="020B0604020202020204" pitchFamily="34" charset="0"/>
-                        </a:rPr>
-                        <a:t>7</a:t>
-                      </a:r>
-                      <a:endParaRPr lang="en-IE" sz="1600" b="0" dirty="0">
-                        <a:solidFill>
-                          <a:schemeClr val="tx1"/>
-                        </a:solidFill>
-                        <a:effectLst/>
-                        <a:latin typeface="Arial" panose="020B0604020202020204" pitchFamily="34" charset="0"/>
-                        <a:ea typeface="Times New Roman"/>
-                        <a:cs typeface="Arial" panose="020B0604020202020204" pitchFamily="34" charset="0"/>
-                      </a:endParaRPr>
-                    </a:p>
-                  </a:txBody>
-                  <a:tcPr marL="68580" marR="68580" marT="0" marB="0">
-                    <a:solidFill>
-                      <a:schemeClr val="bg1">
-                        <a:lumMod val="85000"/>
-                      </a:schemeClr>
-                    </a:solidFill>
-                  </a:tcPr>
-                </a:tc>
-                <a:extLst>
-                  <a:ext uri="{0D108BD9-81ED-4DB2-BD59-A6C34878D82A}">
-                    <a16:rowId xmlns:a16="http://schemas.microsoft.com/office/drawing/2014/main" val="10004"/>
-                  </a:ext>
-                </a:extLst>
-              </a:tr>
-              <a:tr h="0">
-                <a:tc gridSpan="3">
-                  <a:txBody>
-                    <a:bodyPr/>
-                    <a:lstStyle/>
-                    <a:p>
-                      <a:pPr>
-                        <a:spcAft>
-                          <a:spcPts val="0"/>
-                        </a:spcAft>
-                      </a:pPr>
-                      <a:endParaRPr lang="en-IE" sz="800" dirty="0">
-                        <a:solidFill>
-                          <a:schemeClr val="tx1"/>
-                        </a:solidFill>
-                        <a:effectLst/>
-                        <a:latin typeface="Arial" panose="020B0604020202020204" pitchFamily="34" charset="0"/>
-                        <a:ea typeface="Times New Roman"/>
-                        <a:cs typeface="Arial" panose="020B0604020202020204" pitchFamily="34" charset="0"/>
-                      </a:endParaRPr>
-                    </a:p>
-                  </a:txBody>
-                  <a:tcPr marL="68580" marR="68580" marT="0" marB="0" anchor="ctr">
-                    <a:noFill/>
-                  </a:tcPr>
-                </a:tc>
-                <a:tc hMerge="1">
-                  <a:txBody>
-                    <a:bodyPr/>
-                    <a:lstStyle/>
-                    <a:p>
-                      <a:endParaRPr lang="en-IE"/>
-                    </a:p>
-                  </a:txBody>
-                  <a:tcPr/>
-                </a:tc>
-                <a:tc hMerge="1">
-                  <a:txBody>
-                    <a:bodyPr/>
-                    <a:lstStyle/>
-                    <a:p>
-                      <a:endParaRPr lang="en-IE"/>
-                    </a:p>
-                  </a:txBody>
-                  <a:tcPr/>
-                </a:tc>
-                <a:extLst>
-                  <a:ext uri="{0D108BD9-81ED-4DB2-BD59-A6C34878D82A}">
-                    <a16:rowId xmlns:a16="http://schemas.microsoft.com/office/drawing/2014/main" val="10006"/>
-                  </a:ext>
-                </a:extLst>
-              </a:tr>
-              <a:tr h="398339">
-                <a:tc>
-                  <a:txBody>
-                    <a:bodyPr/>
-                    <a:lstStyle/>
-                    <a:p>
-                      <a:pPr>
-                        <a:spcAft>
-                          <a:spcPts val="0"/>
-                        </a:spcAft>
-                      </a:pPr>
-                      <a:r>
-                        <a:rPr lang="en-IE" sz="1800" dirty="0">
-                          <a:solidFill>
-                            <a:schemeClr val="tx1"/>
-                          </a:solidFill>
-                          <a:effectLst/>
-                          <a:latin typeface="Arial" panose="020B0604020202020204" pitchFamily="34" charset="0"/>
-                          <a:ea typeface="Times New Roman"/>
-                          <a:cs typeface="Arial" panose="020B0604020202020204" pitchFamily="34" charset="0"/>
-                        </a:rPr>
-                        <a:t>Secondary Study - 2015</a:t>
-                      </a:r>
-                    </a:p>
-                  </a:txBody>
-                  <a:tcPr marL="68580" marR="68580" marT="0" marB="0" anchor="ctr"/>
-                </a:tc>
-                <a:tc>
-                  <a:txBody>
-                    <a:bodyPr/>
-                    <a:lstStyle/>
-                    <a:p>
-                      <a:pPr marL="0" algn="l" defTabSz="4388900" rtl="0" eaLnBrk="1" latinLnBrk="0" hangingPunct="1">
-                        <a:spcAft>
-                          <a:spcPts val="0"/>
-                        </a:spcAft>
-                      </a:pPr>
-                      <a:r>
-                        <a:rPr lang="en-GB" sz="1800" b="1" kern="1200" dirty="0">
-                          <a:solidFill>
-                            <a:schemeClr val="lt1"/>
-                          </a:solidFill>
-                          <a:effectLst/>
-                          <a:latin typeface="+mn-lt"/>
-                          <a:ea typeface="+mn-ea"/>
-                          <a:cs typeface="+mn-cs"/>
-                        </a:rPr>
-                        <a:t>Analysis</a:t>
-                      </a:r>
-                      <a:endParaRPr lang="en-IE" sz="1800" b="1" kern="1200" dirty="0">
-                        <a:solidFill>
-                          <a:schemeClr val="lt1"/>
-                        </a:solidFill>
-                        <a:effectLst/>
-                        <a:latin typeface="+mn-lt"/>
-                        <a:ea typeface="+mn-ea"/>
-                        <a:cs typeface="+mn-cs"/>
-                      </a:endParaRPr>
-                    </a:p>
-                  </a:txBody>
-                  <a:tcPr marL="68580" marR="68580" marT="0" marB="0" anchor="ctr">
-                    <a:solidFill>
-                      <a:schemeClr val="accent1"/>
-                    </a:solidFill>
-                  </a:tcPr>
-                </a:tc>
-                <a:tc>
-                  <a:txBody>
-                    <a:bodyPr/>
-                    <a:lstStyle/>
-                    <a:p>
-                      <a:pPr marL="0" algn="l" defTabSz="4388900" rtl="0" eaLnBrk="1" latinLnBrk="0" hangingPunct="1">
-                        <a:spcAft>
-                          <a:spcPts val="0"/>
-                        </a:spcAft>
-                      </a:pPr>
-                      <a:r>
-                        <a:rPr lang="en-GB" sz="1800" b="1" kern="1200" dirty="0">
-                          <a:solidFill>
-                            <a:schemeClr val="lt1"/>
-                          </a:solidFill>
-                          <a:effectLst/>
-                          <a:latin typeface="+mn-lt"/>
-                          <a:ea typeface="+mn-ea"/>
-                          <a:cs typeface="+mn-cs"/>
-                        </a:rPr>
-                        <a:t>Sample</a:t>
-                      </a:r>
-                      <a:endParaRPr lang="en-IE" sz="1800" b="1" kern="1200" dirty="0">
-                        <a:solidFill>
-                          <a:schemeClr val="lt1"/>
-                        </a:solidFill>
-                        <a:effectLst/>
-                        <a:latin typeface="+mn-lt"/>
-                        <a:ea typeface="+mn-ea"/>
-                        <a:cs typeface="+mn-cs"/>
-                      </a:endParaRPr>
-                    </a:p>
-                  </a:txBody>
-                  <a:tcPr marL="68580" marR="68580" marT="0" marB="0" anchor="ctr">
-                    <a:solidFill>
-                      <a:schemeClr val="accent1"/>
-                    </a:solidFill>
-                  </a:tcPr>
-                </a:tc>
-                <a:extLst>
-                  <a:ext uri="{0D108BD9-81ED-4DB2-BD59-A6C34878D82A}">
-                    <a16:rowId xmlns:a16="http://schemas.microsoft.com/office/drawing/2014/main" val="10007"/>
-                  </a:ext>
-                </a:extLst>
-              </a:tr>
-              <a:tr h="289638">
-                <a:tc>
-                  <a:txBody>
-                    <a:bodyPr/>
-                    <a:lstStyle/>
-                    <a:p>
-                      <a:pPr>
-                        <a:spcAft>
-                          <a:spcPts val="0"/>
-                        </a:spcAft>
-                      </a:pPr>
-                      <a:r>
-                        <a:rPr lang="en-GB" sz="1600" b="0" dirty="0">
-                          <a:solidFill>
-                            <a:schemeClr val="tx1"/>
-                          </a:solidFill>
-                          <a:effectLst/>
-                          <a:latin typeface="Arial" panose="020B0604020202020204" pitchFamily="34" charset="0"/>
-                          <a:cs typeface="Arial" panose="020B0604020202020204" pitchFamily="34" charset="0"/>
-                        </a:rPr>
-                        <a:t>Student study habits questionnaire</a:t>
-                      </a:r>
-                      <a:endParaRPr lang="en-IE" sz="1600" b="0" dirty="0">
-                        <a:solidFill>
-                          <a:schemeClr val="tx1"/>
-                        </a:solidFill>
-                        <a:effectLst/>
-                        <a:latin typeface="Arial" panose="020B0604020202020204" pitchFamily="34" charset="0"/>
-                        <a:ea typeface="Times New Roman"/>
-                        <a:cs typeface="Arial" panose="020B0604020202020204" pitchFamily="34" charset="0"/>
-                      </a:endParaRPr>
-                    </a:p>
-                  </a:txBody>
-                  <a:tcPr marL="68580" marR="68580" marT="0" marB="0" anchor="ctr">
-                    <a:noFill/>
-                  </a:tcPr>
-                </a:tc>
-                <a:tc>
-                  <a:txBody>
-                    <a:bodyPr/>
-                    <a:lstStyle/>
-                    <a:p>
-                      <a:pPr>
-                        <a:spcAft>
-                          <a:spcPts val="0"/>
-                        </a:spcAft>
-                      </a:pPr>
-                      <a:r>
-                        <a:rPr lang="en-GB" sz="1600" b="0" dirty="0">
-                          <a:solidFill>
-                            <a:schemeClr val="tx1"/>
-                          </a:solidFill>
-                          <a:effectLst/>
-                          <a:latin typeface="Arial" panose="020B0604020202020204" pitchFamily="34" charset="0"/>
-                          <a:cs typeface="Arial" panose="020B0604020202020204" pitchFamily="34" charset="0"/>
-                        </a:rPr>
-                        <a:t>Quantitative</a:t>
-                      </a:r>
-                      <a:endParaRPr lang="en-IE" sz="1600" b="0" dirty="0">
-                        <a:solidFill>
-                          <a:schemeClr val="tx1"/>
-                        </a:solidFill>
-                        <a:effectLst/>
-                        <a:latin typeface="Arial" panose="020B0604020202020204" pitchFamily="34" charset="0"/>
-                        <a:ea typeface="Times New Roman"/>
-                        <a:cs typeface="Arial" panose="020B0604020202020204" pitchFamily="34" charset="0"/>
-                      </a:endParaRPr>
-                    </a:p>
-                  </a:txBody>
-                  <a:tcPr marL="68580" marR="68580" marT="0" marB="0" anchor="ctr">
-                    <a:noFill/>
-                  </a:tcPr>
-                </a:tc>
-                <a:tc>
-                  <a:txBody>
-                    <a:bodyPr/>
-                    <a:lstStyle/>
-                    <a:p>
-                      <a:pPr algn="r">
-                        <a:spcAft>
-                          <a:spcPts val="0"/>
-                        </a:spcAft>
-                      </a:pPr>
-                      <a:r>
-                        <a:rPr lang="en-GB" sz="1600" b="0" dirty="0">
-                          <a:solidFill>
-                            <a:schemeClr val="tx1"/>
-                          </a:solidFill>
-                          <a:effectLst/>
-                          <a:latin typeface="Arial" panose="020B0604020202020204" pitchFamily="34" charset="0"/>
-                          <a:cs typeface="Arial" panose="020B0604020202020204" pitchFamily="34" charset="0"/>
-                        </a:rPr>
-                        <a:t>53</a:t>
-                      </a:r>
-                      <a:endParaRPr lang="en-IE" sz="1600" b="0" dirty="0">
-                        <a:solidFill>
-                          <a:schemeClr val="tx1"/>
-                        </a:solidFill>
-                        <a:effectLst/>
-                        <a:latin typeface="Arial" panose="020B0604020202020204" pitchFamily="34" charset="0"/>
-                        <a:ea typeface="Times New Roman"/>
-                        <a:cs typeface="Arial" panose="020B0604020202020204" pitchFamily="34" charset="0"/>
-                      </a:endParaRPr>
-                    </a:p>
-                  </a:txBody>
-                  <a:tcPr marL="68580" marR="68580" marT="0" marB="0" anchor="ctr">
-                    <a:noFill/>
-                  </a:tcPr>
-                </a:tc>
-                <a:extLst>
-                  <a:ext uri="{0D108BD9-81ED-4DB2-BD59-A6C34878D82A}">
-                    <a16:rowId xmlns:a16="http://schemas.microsoft.com/office/drawing/2014/main" val="10008"/>
-                  </a:ext>
-                </a:extLst>
-              </a:tr>
-              <a:tr h="300445">
-                <a:tc>
-                  <a:txBody>
-                    <a:bodyPr/>
-                    <a:lstStyle/>
-                    <a:p>
-                      <a:pPr>
-                        <a:spcAft>
-                          <a:spcPts val="0"/>
-                        </a:spcAft>
-                      </a:pPr>
-                      <a:r>
-                        <a:rPr lang="en-GB" sz="1600" b="0" dirty="0">
-                          <a:solidFill>
-                            <a:schemeClr val="tx1"/>
-                          </a:solidFill>
-                          <a:effectLst/>
-                          <a:latin typeface="Arial" panose="020B0604020202020204" pitchFamily="34" charset="0"/>
-                          <a:cs typeface="Arial" panose="020B0604020202020204" pitchFamily="34" charset="0"/>
-                        </a:rPr>
-                        <a:t>Reflective Learning Journal</a:t>
-                      </a:r>
-                      <a:endParaRPr lang="en-IE" sz="1600" b="0" dirty="0">
-                        <a:solidFill>
-                          <a:schemeClr val="tx1"/>
-                        </a:solidFill>
-                        <a:effectLst/>
-                        <a:latin typeface="Arial" panose="020B0604020202020204" pitchFamily="34" charset="0"/>
-                        <a:ea typeface="Times New Roman"/>
-                        <a:cs typeface="Arial" panose="020B0604020202020204" pitchFamily="34" charset="0"/>
-                      </a:endParaRPr>
-                    </a:p>
-                  </a:txBody>
-                  <a:tcPr marL="68580" marR="68580" marT="0" marB="0" anchor="ctr">
-                    <a:noFill/>
-                  </a:tcPr>
-                </a:tc>
-                <a:tc>
-                  <a:txBody>
-                    <a:bodyPr/>
-                    <a:lstStyle/>
-                    <a:p>
-                      <a:pPr>
-                        <a:spcAft>
-                          <a:spcPts val="0"/>
-                        </a:spcAft>
-                      </a:pPr>
-                      <a:r>
-                        <a:rPr lang="en-GB" sz="1600" b="0" dirty="0">
-                          <a:solidFill>
-                            <a:schemeClr val="tx1"/>
-                          </a:solidFill>
-                          <a:effectLst/>
-                          <a:latin typeface="Arial" panose="020B0604020202020204" pitchFamily="34" charset="0"/>
-                          <a:cs typeface="Arial" panose="020B0604020202020204" pitchFamily="34" charset="0"/>
-                        </a:rPr>
-                        <a:t>Qualitative</a:t>
-                      </a:r>
-                      <a:endParaRPr lang="en-IE" sz="1600" b="0" dirty="0">
-                        <a:solidFill>
-                          <a:schemeClr val="tx1"/>
-                        </a:solidFill>
-                        <a:effectLst/>
-                        <a:latin typeface="Arial" panose="020B0604020202020204" pitchFamily="34" charset="0"/>
-                        <a:ea typeface="Times New Roman"/>
-                        <a:cs typeface="Arial" panose="020B0604020202020204" pitchFamily="34" charset="0"/>
-                      </a:endParaRPr>
-                    </a:p>
-                  </a:txBody>
-                  <a:tcPr marL="68580" marR="68580" marT="0" marB="0" anchor="ctr">
-                    <a:noFill/>
-                  </a:tcPr>
-                </a:tc>
-                <a:tc>
-                  <a:txBody>
-                    <a:bodyPr/>
-                    <a:lstStyle/>
-                    <a:p>
-                      <a:pPr algn="r">
-                        <a:spcAft>
-                          <a:spcPts val="0"/>
-                        </a:spcAft>
-                      </a:pPr>
-                      <a:r>
-                        <a:rPr lang="en-GB" sz="1600" b="0" dirty="0">
-                          <a:solidFill>
-                            <a:schemeClr val="tx1"/>
-                          </a:solidFill>
-                          <a:effectLst/>
-                          <a:latin typeface="Arial" panose="020B0604020202020204" pitchFamily="34" charset="0"/>
-                          <a:cs typeface="Arial" panose="020B0604020202020204" pitchFamily="34" charset="0"/>
-                        </a:rPr>
-                        <a:t>18</a:t>
-                      </a:r>
-                      <a:endParaRPr lang="en-IE" sz="1600" b="0" dirty="0">
-                        <a:solidFill>
-                          <a:schemeClr val="tx1"/>
-                        </a:solidFill>
-                        <a:effectLst/>
-                        <a:latin typeface="Arial" panose="020B0604020202020204" pitchFamily="34" charset="0"/>
-                        <a:ea typeface="Times New Roman"/>
-                        <a:cs typeface="Arial" panose="020B0604020202020204" pitchFamily="34" charset="0"/>
-                      </a:endParaRPr>
-                    </a:p>
-                  </a:txBody>
-                  <a:tcPr marL="68580" marR="68580" marT="0" marB="0" anchor="ctr">
-                    <a:noFill/>
-                  </a:tcPr>
-                </a:tc>
-                <a:extLst>
-                  <a:ext uri="{0D108BD9-81ED-4DB2-BD59-A6C34878D82A}">
-                    <a16:rowId xmlns:a16="http://schemas.microsoft.com/office/drawing/2014/main" val="10009"/>
-                  </a:ext>
-                </a:extLst>
-              </a:tr>
-              <a:tr h="274320">
-                <a:tc>
-                  <a:txBody>
-                    <a:bodyPr/>
-                    <a:lstStyle/>
-                    <a:p>
-                      <a:pPr>
-                        <a:spcAft>
-                          <a:spcPts val="0"/>
-                        </a:spcAft>
-                      </a:pPr>
-                      <a:r>
-                        <a:rPr lang="en-GB" sz="1600" b="0" dirty="0">
-                          <a:solidFill>
-                            <a:schemeClr val="tx1"/>
-                          </a:solidFill>
-                          <a:effectLst/>
-                          <a:latin typeface="Arial" panose="020B0604020202020204" pitchFamily="34" charset="0"/>
-                          <a:cs typeface="Arial" panose="020B0604020202020204" pitchFamily="34" charset="0"/>
-                        </a:rPr>
-                        <a:t>Interview (Journal evaluation and Study habits)</a:t>
-                      </a:r>
-                      <a:endParaRPr lang="en-IE" sz="1600" b="0" dirty="0">
-                        <a:solidFill>
-                          <a:schemeClr val="tx1"/>
-                        </a:solidFill>
-                        <a:effectLst/>
-                        <a:latin typeface="Arial" panose="020B0604020202020204" pitchFamily="34" charset="0"/>
-                        <a:ea typeface="Times New Roman"/>
-                        <a:cs typeface="Arial" panose="020B0604020202020204" pitchFamily="34" charset="0"/>
-                      </a:endParaRPr>
-                    </a:p>
-                  </a:txBody>
-                  <a:tcPr marL="68580" marR="68580" marT="0" marB="0" anchor="ctr">
-                    <a:noFill/>
-                  </a:tcPr>
-                </a:tc>
-                <a:tc>
-                  <a:txBody>
-                    <a:bodyPr/>
-                    <a:lstStyle/>
-                    <a:p>
-                      <a:pPr>
-                        <a:spcAft>
-                          <a:spcPts val="0"/>
-                        </a:spcAft>
-                      </a:pPr>
-                      <a:r>
-                        <a:rPr lang="en-GB" sz="1600" b="0" dirty="0">
-                          <a:solidFill>
-                            <a:schemeClr val="tx1"/>
-                          </a:solidFill>
-                          <a:effectLst/>
-                          <a:latin typeface="Arial" panose="020B0604020202020204" pitchFamily="34" charset="0"/>
-                          <a:cs typeface="Arial" panose="020B0604020202020204" pitchFamily="34" charset="0"/>
-                        </a:rPr>
-                        <a:t>Qualitative</a:t>
-                      </a:r>
-                      <a:endParaRPr lang="en-IE" sz="1600" b="0" dirty="0">
-                        <a:solidFill>
-                          <a:schemeClr val="tx1"/>
-                        </a:solidFill>
-                        <a:effectLst/>
-                        <a:latin typeface="Arial" panose="020B0604020202020204" pitchFamily="34" charset="0"/>
-                        <a:ea typeface="Times New Roman"/>
-                        <a:cs typeface="Arial" panose="020B0604020202020204" pitchFamily="34" charset="0"/>
-                      </a:endParaRPr>
-                    </a:p>
-                  </a:txBody>
-                  <a:tcPr marL="68580" marR="68580" marT="0" marB="0" anchor="ctr">
-                    <a:noFill/>
-                  </a:tcPr>
-                </a:tc>
-                <a:tc>
-                  <a:txBody>
-                    <a:bodyPr/>
-                    <a:lstStyle/>
-                    <a:p>
-                      <a:pPr algn="r">
-                        <a:spcAft>
-                          <a:spcPts val="0"/>
-                        </a:spcAft>
-                      </a:pPr>
-                      <a:r>
-                        <a:rPr lang="en-GB" sz="1600" b="0" dirty="0">
-                          <a:solidFill>
-                            <a:schemeClr val="tx1"/>
-                          </a:solidFill>
-                          <a:effectLst/>
-                          <a:latin typeface="Arial" panose="020B0604020202020204" pitchFamily="34" charset="0"/>
-                          <a:cs typeface="Arial" panose="020B0604020202020204" pitchFamily="34" charset="0"/>
-                        </a:rPr>
-                        <a:t>4</a:t>
-                      </a:r>
-                      <a:endParaRPr lang="en-IE" sz="1600" b="0" dirty="0">
-                        <a:solidFill>
-                          <a:schemeClr val="tx1"/>
-                        </a:solidFill>
-                        <a:effectLst/>
-                        <a:latin typeface="Arial" panose="020B0604020202020204" pitchFamily="34" charset="0"/>
-                        <a:ea typeface="Times New Roman"/>
-                        <a:cs typeface="Arial" panose="020B0604020202020204" pitchFamily="34" charset="0"/>
-                      </a:endParaRPr>
-                    </a:p>
-                  </a:txBody>
-                  <a:tcPr marL="68580" marR="68580" marT="0" marB="0" anchor="ctr">
-                    <a:noFill/>
-                  </a:tcPr>
-                </a:tc>
-                <a:extLst>
-                  <a:ext uri="{0D108BD9-81ED-4DB2-BD59-A6C34878D82A}">
-                    <a16:rowId xmlns:a16="http://schemas.microsoft.com/office/drawing/2014/main" val="10010"/>
-                  </a:ext>
-                </a:extLst>
-              </a:tr>
-              <a:tr h="0">
-                <a:tc gridSpan="3">
-                  <a:txBody>
-                    <a:bodyPr/>
-                    <a:lstStyle/>
-                    <a:p>
-                      <a:pPr>
-                        <a:spcAft>
-                          <a:spcPts val="0"/>
-                        </a:spcAft>
-                      </a:pPr>
-                      <a:endParaRPr lang="en-IE" sz="800" dirty="0">
-                        <a:solidFill>
-                          <a:schemeClr val="tx1"/>
-                        </a:solidFill>
-                        <a:effectLst/>
-                        <a:latin typeface="Arial" panose="020B0604020202020204" pitchFamily="34" charset="0"/>
-                        <a:ea typeface="Times New Roman"/>
-                        <a:cs typeface="Arial" panose="020B0604020202020204" pitchFamily="34" charset="0"/>
-                      </a:endParaRPr>
-                    </a:p>
-                  </a:txBody>
-                  <a:tcPr marL="68580" marR="68580" marT="0" marB="0" anchor="ctr">
-                    <a:noFill/>
-                  </a:tcPr>
-                </a:tc>
-                <a:tc hMerge="1">
-                  <a:txBody>
-                    <a:bodyPr/>
-                    <a:lstStyle/>
-                    <a:p>
-                      <a:endParaRPr lang="en-IE"/>
-                    </a:p>
-                  </a:txBody>
-                  <a:tcPr/>
-                </a:tc>
-                <a:tc hMerge="1">
-                  <a:txBody>
-                    <a:bodyPr/>
-                    <a:lstStyle/>
-                    <a:p>
-                      <a:endParaRPr lang="en-IE"/>
-                    </a:p>
-                  </a:txBody>
-                  <a:tcPr/>
-                </a:tc>
-                <a:extLst>
-                  <a:ext uri="{0D108BD9-81ED-4DB2-BD59-A6C34878D82A}">
-                    <a16:rowId xmlns:a16="http://schemas.microsoft.com/office/drawing/2014/main" val="10012"/>
-                  </a:ext>
-                </a:extLst>
-              </a:tr>
-              <a:tr h="398339">
-                <a:tc>
-                  <a:txBody>
-                    <a:bodyPr/>
-                    <a:lstStyle/>
-                    <a:p>
-                      <a:pPr>
-                        <a:spcAft>
-                          <a:spcPts val="0"/>
-                        </a:spcAft>
-                      </a:pPr>
-                      <a:r>
-                        <a:rPr lang="en-IE" sz="1800" dirty="0">
-                          <a:solidFill>
-                            <a:schemeClr val="tx1"/>
-                          </a:solidFill>
-                          <a:effectLst/>
-                          <a:latin typeface="Arial" panose="020B0604020202020204" pitchFamily="34" charset="0"/>
-                          <a:ea typeface="Times New Roman"/>
-                          <a:cs typeface="Arial" panose="020B0604020202020204" pitchFamily="34" charset="0"/>
-                        </a:rPr>
-                        <a:t>Principal Study - 2016</a:t>
-                      </a:r>
-                    </a:p>
-                  </a:txBody>
-                  <a:tcPr marL="68580" marR="68580" marT="0" marB="0" anchor="ctr"/>
-                </a:tc>
-                <a:tc>
-                  <a:txBody>
-                    <a:bodyPr/>
-                    <a:lstStyle/>
-                    <a:p>
-                      <a:pPr marL="0" algn="l" defTabSz="4388900" rtl="0" eaLnBrk="1" latinLnBrk="0" hangingPunct="1">
-                        <a:spcAft>
-                          <a:spcPts val="0"/>
-                        </a:spcAft>
-                      </a:pPr>
-                      <a:r>
-                        <a:rPr lang="en-GB" sz="2000" b="1" kern="1200" dirty="0">
-                          <a:solidFill>
-                            <a:schemeClr val="lt1"/>
-                          </a:solidFill>
-                          <a:effectLst/>
-                          <a:latin typeface="+mn-lt"/>
-                          <a:ea typeface="+mn-ea"/>
-                          <a:cs typeface="+mn-cs"/>
-                        </a:rPr>
-                        <a:t>Analysis</a:t>
-                      </a:r>
-                      <a:endParaRPr lang="en-IE" sz="2000" b="1" kern="1200" dirty="0">
-                        <a:solidFill>
-                          <a:schemeClr val="lt1"/>
-                        </a:solidFill>
-                        <a:effectLst/>
-                        <a:latin typeface="+mn-lt"/>
-                        <a:ea typeface="+mn-ea"/>
-                        <a:cs typeface="+mn-cs"/>
-                      </a:endParaRPr>
-                    </a:p>
-                  </a:txBody>
-                  <a:tcPr marL="68580" marR="68580" marT="0" marB="0" anchor="ctr">
-                    <a:solidFill>
-                      <a:schemeClr val="accent1"/>
-                    </a:solidFill>
-                  </a:tcPr>
-                </a:tc>
-                <a:tc>
-                  <a:txBody>
-                    <a:bodyPr/>
-                    <a:lstStyle/>
-                    <a:p>
-                      <a:pPr marL="0" algn="l" defTabSz="4388900" rtl="0" eaLnBrk="1" latinLnBrk="0" hangingPunct="1">
-                        <a:spcAft>
-                          <a:spcPts val="0"/>
-                        </a:spcAft>
-                      </a:pPr>
-                      <a:r>
-                        <a:rPr lang="en-GB" sz="2000" b="1" kern="1200" dirty="0">
-                          <a:solidFill>
-                            <a:schemeClr val="lt1"/>
-                          </a:solidFill>
-                          <a:effectLst/>
-                          <a:latin typeface="+mn-lt"/>
-                          <a:ea typeface="+mn-ea"/>
-                          <a:cs typeface="+mn-cs"/>
-                        </a:rPr>
-                        <a:t>Sample</a:t>
-                      </a:r>
-                      <a:endParaRPr lang="en-IE" sz="2000" b="1" kern="1200" dirty="0">
-                        <a:solidFill>
-                          <a:schemeClr val="lt1"/>
-                        </a:solidFill>
-                        <a:effectLst/>
-                        <a:latin typeface="+mn-lt"/>
-                        <a:ea typeface="+mn-ea"/>
-                        <a:cs typeface="+mn-cs"/>
-                      </a:endParaRPr>
-                    </a:p>
-                  </a:txBody>
-                  <a:tcPr marL="68580" marR="68580" marT="0" marB="0" anchor="ctr">
-                    <a:solidFill>
-                      <a:schemeClr val="accent1"/>
-                    </a:solidFill>
-                  </a:tcPr>
-                </a:tc>
-                <a:extLst>
-                  <a:ext uri="{0D108BD9-81ED-4DB2-BD59-A6C34878D82A}">
-                    <a16:rowId xmlns:a16="http://schemas.microsoft.com/office/drawing/2014/main" val="10013"/>
-                  </a:ext>
-                </a:extLst>
-              </a:tr>
-              <a:tr h="289639">
-                <a:tc>
-                  <a:txBody>
-                    <a:bodyPr/>
-                    <a:lstStyle/>
-                    <a:p>
-                      <a:pPr marL="0" algn="l" defTabSz="4388900" rtl="0" eaLnBrk="1" latinLnBrk="0" hangingPunct="1">
-                        <a:spcAft>
-                          <a:spcPts val="0"/>
-                        </a:spcAft>
-                      </a:pPr>
-                      <a:r>
-                        <a:rPr lang="en-IE" sz="1600" b="0" kern="1200" dirty="0">
-                          <a:solidFill>
-                            <a:schemeClr val="tx1"/>
-                          </a:solidFill>
-                          <a:effectLst/>
-                          <a:latin typeface="Arial" panose="020B0604020202020204" pitchFamily="34" charset="0"/>
-                          <a:ea typeface="+mn-ea"/>
-                          <a:cs typeface="Arial" panose="020B0604020202020204" pitchFamily="34" charset="0"/>
-                        </a:rPr>
-                        <a:t>Student Engagement &amp; Self-Efficacy Questionnaire – (Treatment</a:t>
-                      </a:r>
-                      <a:r>
-                        <a:rPr lang="en-IE" sz="1600" b="0" kern="1200" baseline="0" dirty="0">
-                          <a:solidFill>
-                            <a:schemeClr val="tx1"/>
-                          </a:solidFill>
-                          <a:effectLst/>
-                          <a:latin typeface="Arial" panose="020B0604020202020204" pitchFamily="34" charset="0"/>
-                          <a:ea typeface="+mn-ea"/>
-                          <a:cs typeface="Arial" panose="020B0604020202020204" pitchFamily="34" charset="0"/>
-                        </a:rPr>
-                        <a:t> Group)</a:t>
-                      </a:r>
-                      <a:endParaRPr lang="en-IE" sz="1600" b="0" kern="1200" dirty="0">
-                        <a:solidFill>
-                          <a:schemeClr val="tx1"/>
-                        </a:solidFill>
-                        <a:effectLst/>
-                        <a:latin typeface="Arial" panose="020B0604020202020204" pitchFamily="34" charset="0"/>
-                        <a:ea typeface="+mn-ea"/>
-                        <a:cs typeface="Arial" panose="020B0604020202020204" pitchFamily="34" charset="0"/>
-                      </a:endParaRPr>
-                    </a:p>
-                  </a:txBody>
-                  <a:tcPr marL="68580" marR="68580" marT="0" marB="0" anchor="ctr">
-                    <a:noFill/>
-                  </a:tcPr>
-                </a:tc>
-                <a:tc>
-                  <a:txBody>
-                    <a:bodyPr/>
-                    <a:lstStyle/>
-                    <a:p>
-                      <a:pPr>
-                        <a:spcAft>
-                          <a:spcPts val="0"/>
-                        </a:spcAft>
-                      </a:pPr>
-                      <a:r>
-                        <a:rPr lang="en-GB" sz="1600" b="0" dirty="0">
-                          <a:solidFill>
-                            <a:schemeClr val="tx1"/>
-                          </a:solidFill>
-                          <a:effectLst/>
-                          <a:latin typeface="Arial" panose="020B0604020202020204" pitchFamily="34" charset="0"/>
-                          <a:cs typeface="Arial" panose="020B0604020202020204" pitchFamily="34" charset="0"/>
-                        </a:rPr>
-                        <a:t>Quantitative</a:t>
-                      </a:r>
-                      <a:endParaRPr lang="en-IE" sz="1600" b="0" dirty="0">
-                        <a:solidFill>
-                          <a:schemeClr val="tx1"/>
-                        </a:solidFill>
-                        <a:effectLst/>
-                        <a:latin typeface="Arial" panose="020B0604020202020204" pitchFamily="34" charset="0"/>
-                        <a:ea typeface="Times New Roman"/>
-                        <a:cs typeface="Arial" panose="020B0604020202020204" pitchFamily="34" charset="0"/>
-                      </a:endParaRPr>
-                    </a:p>
-                  </a:txBody>
-                  <a:tcPr marL="68580" marR="68580" marT="0" marB="0" anchor="ctr">
-                    <a:noFill/>
-                  </a:tcPr>
-                </a:tc>
-                <a:tc>
-                  <a:txBody>
-                    <a:bodyPr/>
-                    <a:lstStyle/>
-                    <a:p>
-                      <a:pPr algn="r">
-                        <a:spcAft>
-                          <a:spcPts val="0"/>
-                        </a:spcAft>
-                      </a:pPr>
-                      <a:r>
-                        <a:rPr lang="en-GB" sz="1600" b="0" dirty="0">
-                          <a:solidFill>
-                            <a:schemeClr val="tx1"/>
-                          </a:solidFill>
-                          <a:effectLst/>
-                          <a:latin typeface="Arial" panose="020B0604020202020204" pitchFamily="34" charset="0"/>
-                          <a:cs typeface="Arial" panose="020B0604020202020204" pitchFamily="34" charset="0"/>
-                        </a:rPr>
-                        <a:t>44</a:t>
-                      </a:r>
-                      <a:endParaRPr lang="en-IE" sz="1600" b="0" dirty="0">
-                        <a:solidFill>
-                          <a:schemeClr val="tx1"/>
-                        </a:solidFill>
-                        <a:effectLst/>
-                        <a:latin typeface="Arial" panose="020B0604020202020204" pitchFamily="34" charset="0"/>
-                        <a:ea typeface="Times New Roman"/>
-                        <a:cs typeface="Arial" panose="020B0604020202020204" pitchFamily="34" charset="0"/>
-                      </a:endParaRPr>
-                    </a:p>
-                  </a:txBody>
-                  <a:tcPr marL="68580" marR="68580" marT="0" marB="0" anchor="ctr">
-                    <a:noFill/>
-                  </a:tcPr>
-                </a:tc>
-                <a:extLst>
-                  <a:ext uri="{0D108BD9-81ED-4DB2-BD59-A6C34878D82A}">
-                    <a16:rowId xmlns:a16="http://schemas.microsoft.com/office/drawing/2014/main" val="10014"/>
-                  </a:ext>
-                </a:extLst>
-              </a:tr>
-              <a:tr h="326571">
-                <a:tc>
-                  <a:txBody>
-                    <a:bodyPr/>
-                    <a:lstStyle/>
-                    <a:p>
-                      <a:pPr marL="0" algn="l" defTabSz="4388900" rtl="0" eaLnBrk="1" latinLnBrk="0" hangingPunct="1">
-                        <a:spcAft>
-                          <a:spcPts val="0"/>
-                        </a:spcAft>
-                      </a:pPr>
-                      <a:r>
-                        <a:rPr lang="en-IE" sz="1600" b="0" kern="1200" dirty="0">
-                          <a:solidFill>
-                            <a:schemeClr val="tx1"/>
-                          </a:solidFill>
-                          <a:effectLst/>
-                          <a:latin typeface="Arial" panose="020B0604020202020204" pitchFamily="34" charset="0"/>
-                          <a:ea typeface="+mn-ea"/>
-                          <a:cs typeface="Arial" panose="020B0604020202020204" pitchFamily="34" charset="0"/>
-                        </a:rPr>
-                        <a:t>Student Engagement &amp; Self-Efficacy Questionnaire –(Control)</a:t>
-                      </a:r>
-                    </a:p>
-                  </a:txBody>
-                  <a:tcPr marL="68580" marR="68580" marT="0" marB="0" anchor="ctr">
-                    <a:noFill/>
-                  </a:tcPr>
-                </a:tc>
-                <a:tc>
-                  <a:txBody>
-                    <a:bodyPr/>
-                    <a:lstStyle/>
-                    <a:p>
-                      <a:pPr>
-                        <a:spcAft>
-                          <a:spcPts val="0"/>
-                        </a:spcAft>
-                      </a:pPr>
-                      <a:r>
-                        <a:rPr lang="en-GB" sz="1600" b="0" dirty="0">
-                          <a:solidFill>
-                            <a:schemeClr val="tx1"/>
-                          </a:solidFill>
-                          <a:effectLst/>
-                          <a:latin typeface="Arial" panose="020B0604020202020204" pitchFamily="34" charset="0"/>
-                          <a:cs typeface="Arial" panose="020B0604020202020204" pitchFamily="34" charset="0"/>
-                        </a:rPr>
-                        <a:t>Quantitative</a:t>
-                      </a:r>
-                      <a:endParaRPr lang="en-IE" sz="1600" b="0" dirty="0">
-                        <a:solidFill>
-                          <a:schemeClr val="tx1"/>
-                        </a:solidFill>
-                        <a:effectLst/>
-                        <a:latin typeface="Arial" panose="020B0604020202020204" pitchFamily="34" charset="0"/>
-                        <a:ea typeface="Times New Roman"/>
-                        <a:cs typeface="Arial" panose="020B0604020202020204" pitchFamily="34" charset="0"/>
-                      </a:endParaRPr>
-                    </a:p>
-                  </a:txBody>
-                  <a:tcPr marL="68580" marR="68580" marT="0" marB="0" anchor="ctr">
-                    <a:noFill/>
-                  </a:tcPr>
-                </a:tc>
-                <a:tc>
-                  <a:txBody>
-                    <a:bodyPr/>
-                    <a:lstStyle/>
-                    <a:p>
-                      <a:pPr algn="r">
-                        <a:spcAft>
-                          <a:spcPts val="0"/>
-                        </a:spcAft>
-                      </a:pPr>
-                      <a:r>
-                        <a:rPr lang="en-GB" sz="1600" b="0" dirty="0">
-                          <a:solidFill>
-                            <a:schemeClr val="tx1"/>
-                          </a:solidFill>
-                          <a:effectLst/>
-                          <a:latin typeface="Arial" panose="020B0604020202020204" pitchFamily="34" charset="0"/>
-                          <a:cs typeface="Arial" panose="020B0604020202020204" pitchFamily="34" charset="0"/>
-                        </a:rPr>
-                        <a:t>31</a:t>
-                      </a:r>
-                      <a:endParaRPr lang="en-IE" sz="1600" b="0" dirty="0">
-                        <a:solidFill>
-                          <a:schemeClr val="tx1"/>
-                        </a:solidFill>
-                        <a:effectLst/>
-                        <a:latin typeface="Arial" panose="020B0604020202020204" pitchFamily="34" charset="0"/>
-                        <a:ea typeface="Times New Roman"/>
-                        <a:cs typeface="Arial" panose="020B0604020202020204" pitchFamily="34" charset="0"/>
-                      </a:endParaRPr>
-                    </a:p>
-                  </a:txBody>
-                  <a:tcPr marL="68580" marR="68580" marT="0" marB="0" anchor="ctr">
-                    <a:noFill/>
-                  </a:tcPr>
-                </a:tc>
-                <a:extLst>
-                  <a:ext uri="{0D108BD9-81ED-4DB2-BD59-A6C34878D82A}">
-                    <a16:rowId xmlns:a16="http://schemas.microsoft.com/office/drawing/2014/main" val="10015"/>
-                  </a:ext>
-                </a:extLst>
-              </a:tr>
-              <a:tr h="300446">
-                <a:tc>
-                  <a:txBody>
-                    <a:bodyPr/>
-                    <a:lstStyle/>
-                    <a:p>
-                      <a:pPr>
-                        <a:spcAft>
-                          <a:spcPts val="0"/>
-                        </a:spcAft>
-                      </a:pPr>
-                      <a:r>
-                        <a:rPr lang="en-IE" sz="1600" b="0" dirty="0">
-                          <a:solidFill>
-                            <a:schemeClr val="tx1"/>
-                          </a:solidFill>
-                          <a:effectLst/>
-                          <a:latin typeface="Arial" panose="020B0604020202020204" pitchFamily="34" charset="0"/>
-                          <a:cs typeface="Arial" panose="020B0604020202020204" pitchFamily="34" charset="0"/>
-                        </a:rPr>
-                        <a:t>Interview (start and end of semester with principal programming lecturer )</a:t>
-                      </a:r>
-                      <a:endParaRPr lang="en-IE" sz="1600" b="0" dirty="0">
-                        <a:solidFill>
-                          <a:schemeClr val="tx1"/>
-                        </a:solidFill>
-                        <a:effectLst/>
-                        <a:latin typeface="Arial" panose="020B0604020202020204" pitchFamily="34" charset="0"/>
-                        <a:ea typeface="Times New Roman"/>
-                        <a:cs typeface="Arial" panose="020B0604020202020204" pitchFamily="34" charset="0"/>
-                      </a:endParaRPr>
-                    </a:p>
-                  </a:txBody>
-                  <a:tcPr marL="68580" marR="68580" marT="0" marB="0" anchor="ctr">
-                    <a:noFill/>
-                  </a:tcPr>
-                </a:tc>
-                <a:tc>
-                  <a:txBody>
-                    <a:bodyPr/>
-                    <a:lstStyle/>
-                    <a:p>
-                      <a:pPr>
-                        <a:spcAft>
-                          <a:spcPts val="0"/>
-                        </a:spcAft>
-                      </a:pPr>
-                      <a:r>
-                        <a:rPr lang="en-GB" sz="1600" b="0" dirty="0">
-                          <a:solidFill>
-                            <a:schemeClr val="tx1"/>
-                          </a:solidFill>
-                          <a:effectLst/>
-                          <a:latin typeface="Arial" panose="020B0604020202020204" pitchFamily="34" charset="0"/>
-                          <a:cs typeface="Arial" panose="020B0604020202020204" pitchFamily="34" charset="0"/>
-                        </a:rPr>
-                        <a:t>Qualitative</a:t>
-                      </a:r>
-                      <a:endParaRPr lang="en-IE" sz="1600" b="0" dirty="0">
-                        <a:solidFill>
-                          <a:schemeClr val="tx1"/>
-                        </a:solidFill>
-                        <a:effectLst/>
-                        <a:latin typeface="Arial" panose="020B0604020202020204" pitchFamily="34" charset="0"/>
-                        <a:ea typeface="Times New Roman"/>
-                        <a:cs typeface="Arial" panose="020B0604020202020204" pitchFamily="34" charset="0"/>
-                      </a:endParaRPr>
-                    </a:p>
-                  </a:txBody>
-                  <a:tcPr marL="68580" marR="68580" marT="0" marB="0" anchor="ctr">
-                    <a:noFill/>
-                  </a:tcPr>
-                </a:tc>
-                <a:tc>
-                  <a:txBody>
-                    <a:bodyPr/>
-                    <a:lstStyle/>
-                    <a:p>
-                      <a:pPr algn="r">
-                        <a:spcAft>
-                          <a:spcPts val="0"/>
-                        </a:spcAft>
-                      </a:pPr>
-                      <a:r>
-                        <a:rPr lang="en-GB" sz="1600" b="0" dirty="0">
-                          <a:solidFill>
-                            <a:schemeClr val="tx1"/>
-                          </a:solidFill>
-                          <a:effectLst/>
-                          <a:latin typeface="Arial" panose="020B0604020202020204" pitchFamily="34" charset="0"/>
-                          <a:cs typeface="Arial" panose="020B0604020202020204" pitchFamily="34" charset="0"/>
-                        </a:rPr>
-                        <a:t>1</a:t>
-                      </a:r>
-                      <a:endParaRPr lang="en-IE" sz="1600" b="0" dirty="0">
-                        <a:solidFill>
-                          <a:schemeClr val="tx1"/>
-                        </a:solidFill>
-                        <a:effectLst/>
-                        <a:latin typeface="Arial" panose="020B0604020202020204" pitchFamily="34" charset="0"/>
-                        <a:ea typeface="Times New Roman"/>
-                        <a:cs typeface="Arial" panose="020B0604020202020204" pitchFamily="34" charset="0"/>
-                      </a:endParaRPr>
-                    </a:p>
-                  </a:txBody>
-                  <a:tcPr marL="68580" marR="68580" marT="0" marB="0" anchor="ctr">
-                    <a:noFill/>
-                  </a:tcPr>
-                </a:tc>
-                <a:extLst>
-                  <a:ext uri="{0D108BD9-81ED-4DB2-BD59-A6C34878D82A}">
-                    <a16:rowId xmlns:a16="http://schemas.microsoft.com/office/drawing/2014/main" val="10016"/>
-                  </a:ext>
-                </a:extLst>
-              </a:tr>
-              <a:tr h="300445">
-                <a:tc>
-                  <a:txBody>
-                    <a:bodyPr/>
-                    <a:lstStyle/>
-                    <a:p>
-                      <a:pPr>
-                        <a:spcAft>
-                          <a:spcPts val="0"/>
-                        </a:spcAft>
-                      </a:pPr>
-                      <a:r>
-                        <a:rPr lang="en-IE" sz="1600" b="0" dirty="0">
-                          <a:solidFill>
-                            <a:schemeClr val="tx1"/>
-                          </a:solidFill>
-                          <a:effectLst/>
-                          <a:latin typeface="Arial" panose="020B0604020202020204" pitchFamily="34" charset="0"/>
-                          <a:cs typeface="Arial" panose="020B0604020202020204" pitchFamily="34" charset="0"/>
-                        </a:rPr>
-                        <a:t>Interview (end of semester with treatment group participants)</a:t>
-                      </a:r>
-                      <a:endParaRPr lang="en-IE" sz="1600" b="0" dirty="0">
-                        <a:solidFill>
-                          <a:schemeClr val="tx1"/>
-                        </a:solidFill>
-                        <a:effectLst/>
-                        <a:latin typeface="Arial" panose="020B0604020202020204" pitchFamily="34" charset="0"/>
-                        <a:ea typeface="Times New Roman"/>
-                        <a:cs typeface="Arial" panose="020B0604020202020204" pitchFamily="34" charset="0"/>
-                      </a:endParaRPr>
-                    </a:p>
-                  </a:txBody>
-                  <a:tcPr marL="68580" marR="68580" marT="0" marB="0" anchor="ctr">
-                    <a:noFill/>
-                  </a:tcPr>
-                </a:tc>
-                <a:tc>
-                  <a:txBody>
-                    <a:bodyPr/>
-                    <a:lstStyle/>
-                    <a:p>
-                      <a:pPr>
-                        <a:spcAft>
-                          <a:spcPts val="0"/>
-                        </a:spcAft>
-                      </a:pPr>
-                      <a:r>
-                        <a:rPr lang="en-GB" sz="1600" b="0" dirty="0">
-                          <a:solidFill>
-                            <a:schemeClr val="tx1"/>
-                          </a:solidFill>
-                          <a:effectLst/>
-                          <a:latin typeface="Arial" panose="020B0604020202020204" pitchFamily="34" charset="0"/>
-                          <a:cs typeface="Arial" panose="020B0604020202020204" pitchFamily="34" charset="0"/>
-                        </a:rPr>
-                        <a:t>Qualitative</a:t>
-                      </a:r>
-                      <a:endParaRPr lang="en-IE" sz="1600" b="0" dirty="0">
-                        <a:solidFill>
-                          <a:schemeClr val="tx1"/>
-                        </a:solidFill>
-                        <a:effectLst/>
-                        <a:latin typeface="Arial" panose="020B0604020202020204" pitchFamily="34" charset="0"/>
-                        <a:ea typeface="Times New Roman"/>
-                        <a:cs typeface="Arial" panose="020B0604020202020204" pitchFamily="34" charset="0"/>
-                      </a:endParaRPr>
-                    </a:p>
-                  </a:txBody>
-                  <a:tcPr marL="68580" marR="68580" marT="0" marB="0" anchor="ctr">
-                    <a:noFill/>
-                  </a:tcPr>
-                </a:tc>
-                <a:tc>
-                  <a:txBody>
-                    <a:bodyPr/>
-                    <a:lstStyle/>
-                    <a:p>
-                      <a:pPr algn="r">
-                        <a:spcAft>
-                          <a:spcPts val="0"/>
-                        </a:spcAft>
-                      </a:pPr>
-                      <a:r>
-                        <a:rPr lang="en-GB" sz="1600" b="0" dirty="0">
-                          <a:solidFill>
-                            <a:schemeClr val="tx1"/>
-                          </a:solidFill>
-                          <a:effectLst/>
-                          <a:latin typeface="Arial" panose="020B0604020202020204" pitchFamily="34" charset="0"/>
-                          <a:cs typeface="Arial" panose="020B0604020202020204" pitchFamily="34" charset="0"/>
-                        </a:rPr>
-                        <a:t>4</a:t>
-                      </a:r>
-                      <a:endParaRPr lang="en-IE" sz="1600" b="0" dirty="0">
-                        <a:solidFill>
-                          <a:schemeClr val="tx1"/>
-                        </a:solidFill>
-                        <a:effectLst/>
-                        <a:latin typeface="Arial" panose="020B0604020202020204" pitchFamily="34" charset="0"/>
-                        <a:ea typeface="Times New Roman"/>
-                        <a:cs typeface="Arial" panose="020B0604020202020204" pitchFamily="34" charset="0"/>
-                      </a:endParaRPr>
-                    </a:p>
-                  </a:txBody>
-                  <a:tcPr marL="68580" marR="68580" marT="0" marB="0" anchor="ctr">
-                    <a:noFill/>
-                  </a:tcPr>
-                </a:tc>
-                <a:extLst>
-                  <a:ext uri="{0D108BD9-81ED-4DB2-BD59-A6C34878D82A}">
-                    <a16:rowId xmlns:a16="http://schemas.microsoft.com/office/drawing/2014/main" val="10017"/>
-                  </a:ext>
-                </a:extLst>
-              </a:tr>
-              <a:tr h="308218">
-                <a:tc>
-                  <a:txBody>
-                    <a:bodyPr/>
-                    <a:lstStyle/>
-                    <a:p>
-                      <a:pPr>
-                        <a:spcAft>
-                          <a:spcPts val="0"/>
-                        </a:spcAft>
-                      </a:pPr>
-                      <a:r>
-                        <a:rPr lang="en-IE" sz="1600" b="0" dirty="0">
-                          <a:solidFill>
-                            <a:schemeClr val="tx1"/>
-                          </a:solidFill>
-                          <a:effectLst/>
-                          <a:latin typeface="Arial" panose="020B0604020202020204" pitchFamily="34" charset="0"/>
-                          <a:cs typeface="Arial" panose="020B0604020202020204" pitchFamily="34" charset="0"/>
-                        </a:rPr>
-                        <a:t>PBL/PAL activity feedback forms (5x sessions)</a:t>
-                      </a:r>
-                      <a:endParaRPr lang="en-IE" sz="1600" b="0" dirty="0">
-                        <a:solidFill>
-                          <a:schemeClr val="tx1"/>
-                        </a:solidFill>
-                        <a:effectLst/>
-                        <a:latin typeface="Arial" panose="020B0604020202020204" pitchFamily="34" charset="0"/>
-                        <a:ea typeface="Times New Roman"/>
-                        <a:cs typeface="Arial" panose="020B0604020202020204" pitchFamily="34" charset="0"/>
-                      </a:endParaRPr>
-                    </a:p>
-                  </a:txBody>
-                  <a:tcPr marL="68580" marR="68580" marT="0" marB="0" anchor="ctr">
-                    <a:noFill/>
-                  </a:tcPr>
-                </a:tc>
-                <a:tc>
-                  <a:txBody>
-                    <a:bodyPr/>
-                    <a:lstStyle/>
-                    <a:p>
-                      <a:pPr>
-                        <a:spcAft>
-                          <a:spcPts val="0"/>
-                        </a:spcAft>
-                      </a:pPr>
-                      <a:r>
-                        <a:rPr lang="en-GB" sz="1600" b="0" dirty="0">
-                          <a:solidFill>
-                            <a:schemeClr val="tx1"/>
-                          </a:solidFill>
-                          <a:effectLst/>
-                          <a:latin typeface="Arial" panose="020B0604020202020204" pitchFamily="34" charset="0"/>
-                          <a:cs typeface="Arial" panose="020B0604020202020204" pitchFamily="34" charset="0"/>
-                        </a:rPr>
-                        <a:t>Qualitative</a:t>
-                      </a:r>
-                      <a:endParaRPr lang="en-IE" sz="1600" b="0" dirty="0">
-                        <a:solidFill>
-                          <a:schemeClr val="tx1"/>
-                        </a:solidFill>
-                        <a:effectLst/>
-                        <a:latin typeface="Arial" panose="020B0604020202020204" pitchFamily="34" charset="0"/>
-                        <a:ea typeface="Times New Roman"/>
-                        <a:cs typeface="Arial" panose="020B0604020202020204" pitchFamily="34" charset="0"/>
-                      </a:endParaRPr>
-                    </a:p>
-                  </a:txBody>
-                  <a:tcPr marL="68580" marR="68580" marT="0" marB="0" anchor="ctr">
-                    <a:noFill/>
-                  </a:tcPr>
-                </a:tc>
-                <a:tc>
-                  <a:txBody>
-                    <a:bodyPr/>
-                    <a:lstStyle/>
-                    <a:p>
-                      <a:pPr algn="r">
-                        <a:spcAft>
-                          <a:spcPts val="0"/>
-                        </a:spcAft>
-                      </a:pPr>
-                      <a:r>
-                        <a:rPr lang="en-GB" sz="1600" b="0" dirty="0">
-                          <a:solidFill>
-                            <a:schemeClr val="tx1"/>
-                          </a:solidFill>
-                          <a:effectLst/>
-                          <a:latin typeface="Arial" panose="020B0604020202020204" pitchFamily="34" charset="0"/>
-                          <a:cs typeface="Arial" panose="020B0604020202020204" pitchFamily="34" charset="0"/>
-                        </a:rPr>
-                        <a:t>46</a:t>
-                      </a:r>
-                      <a:endParaRPr lang="en-IE" sz="1600" b="0" dirty="0">
-                        <a:solidFill>
-                          <a:schemeClr val="tx1"/>
-                        </a:solidFill>
-                        <a:effectLst/>
-                        <a:latin typeface="Arial" panose="020B0604020202020204" pitchFamily="34" charset="0"/>
-                        <a:ea typeface="Times New Roman"/>
-                        <a:cs typeface="Arial" panose="020B0604020202020204" pitchFamily="34" charset="0"/>
-                      </a:endParaRPr>
-                    </a:p>
-                  </a:txBody>
-                  <a:tcPr marL="68580" marR="68580" marT="0" marB="0" anchor="ctr">
-                    <a:noFill/>
-                  </a:tcPr>
-                </a:tc>
-                <a:extLst>
-                  <a:ext uri="{0D108BD9-81ED-4DB2-BD59-A6C34878D82A}">
-                    <a16:rowId xmlns:a16="http://schemas.microsoft.com/office/drawing/2014/main" val="10018"/>
-                  </a:ext>
-                </a:extLst>
-              </a:tr>
-            </a:tbl>
-          </a:graphicData>
-        </a:graphic>
-      </p:graphicFrame>
       <p:sp>
         <p:nvSpPr>
           <p:cNvPr id="45" name="Text Placeholder 4"/>
@@ -18271,7 +15985,7 @@
         <p:spPr>
           <a:xfrm>
             <a:off x="11449319" y="17642446"/>
-            <a:ext cx="10048874" cy="1200306"/>
+            <a:ext cx="10048874" cy="2308302"/>
           </a:xfrm>
           <a:prstGeom prst="rect">
             <a:avLst/>
@@ -18422,22 +16136,15 @@
           </a:lstStyle>
           <a:p>
             <a:r>
-              <a:rPr lang="en-GB" sz="2400" dirty="0">
+              <a:rPr lang="en-US" sz="2400" dirty="0">
                 <a:solidFill>
                   <a:schemeClr val="tx1"/>
                 </a:solidFill>
                 <a:latin typeface="Arial" panose="020B0604020202020204" pitchFamily="34" charset="0"/>
                 <a:cs typeface="Arial" panose="020B0604020202020204" pitchFamily="34" charset="0"/>
               </a:rPr>
-              <a:t>The diagram below highlights the methods and tools used over the course of the action research study. </a:t>
+              <a:t>The data that was chosen was based on problem that is the cars using fuel which pollutes the Environment, we gather information of  electric cars which would not produce any CO2 and helps reduce the global warming. We will evaluated electric cars only and show the range  between a hybrid and battery one.  </a:t>
             </a:r>
-            <a:endParaRPr lang="en-US" sz="2400" dirty="0">
-              <a:solidFill>
-                <a:schemeClr val="tx1"/>
-              </a:solidFill>
-              <a:latin typeface="Arial" panose="020B0604020202020204" pitchFamily="34" charset="0"/>
-              <a:cs typeface="Arial" panose="020B0604020202020204" pitchFamily="34" charset="0"/>
-            </a:endParaRPr>
           </a:p>
         </p:txBody>
       </p:sp>
@@ -18644,7 +16351,7 @@
         </p:nvSpPr>
         <p:spPr>
           <a:xfrm>
-            <a:off x="22531031" y="12554206"/>
+            <a:off x="22531031" y="15890679"/>
             <a:ext cx="9795691" cy="5522693"/>
           </a:xfrm>
           <a:prstGeom prst="rect">
@@ -18796,10 +16503,7 @@
             <a:pPr marL="0" indent="0">
               <a:buNone/>
             </a:pPr>
-            <a:r>
-              <a:rPr lang="en-IE" sz="2500" dirty="0"/>
-              <a:t>A student engagement measurement tool was provided to student participants at the start and end of a semester.  A social learning intervention was applied to a treatment group, and the engagement scores across both the control and treatment groups were measured.  The results revealed a small increase in total student engagement group score for the treatment group, but nothing significant. However, interesting findings were found in some of the individual questions, the figure below represents one an example of this, in which the treatment group had scored considerably higher than the control group in a question relating to understanding people dissimilar to themselves, which would have been influenced through the social learning activities that the treatment group participated in.  This, in itself, was an encouraging finding. </a:t>
-            </a:r>
+            <a:endParaRPr lang="en-IE" sz="2500" dirty="0"/>
           </a:p>
         </p:txBody>
       </p:sp>
@@ -18819,7 +16523,7 @@
         </p:nvSpPr>
         <p:spPr>
           <a:xfrm>
-            <a:off x="33656519" y="29479722"/>
+            <a:off x="33742951" y="22261667"/>
             <a:ext cx="9736942" cy="2621175"/>
           </a:xfrm>
           <a:prstGeom prst="rect">
@@ -18971,13 +16675,121 @@
             <a:pPr marL="0" indent="0" algn="just" defTabSz="895350">
               <a:buNone/>
             </a:pPr>
+            <a:endParaRPr lang="en-IE" sz="900" dirty="0">
+              <a:latin typeface="Arial" panose="020B0604020202020204" pitchFamily="34" charset="0"/>
+              <a:cs typeface="Arial" panose="020B0604020202020204" pitchFamily="34" charset="0"/>
+            </a:endParaRPr>
+          </a:p>
+          <a:p>
+            <a:pPr marL="0" indent="0" algn="just" defTabSz="895350">
+              <a:buNone/>
+            </a:pPr>
             <a:r>
-              <a:rPr lang="en-IE" sz="900" dirty="0">
+              <a:rPr lang="en-IE" sz="2000" dirty="0">
+                <a:latin typeface="Arial" panose="020B0604020202020204" pitchFamily="34" charset="0"/>
+                <a:cs typeface="Arial" panose="020B0604020202020204" pitchFamily="34" charset="0"/>
+                <a:hlinkClick r:id="rId3">
+                  <a:extLst>
+                    <a:ext uri="{A12FA001-AC4F-418D-AE19-62706E023703}">
+                      <ahyp:hlinkClr xmlns:ahyp="http://schemas.microsoft.com/office/drawing/2018/hyperlinkcolor" val="tx"/>
+                    </a:ext>
+                  </a:extLst>
+                </a:hlinkClick>
+              </a:rPr>
+              <a:t>https://jcu.pressbooks.pub/intro-res-methods-health/chapter/1-3-research-paradigms-and-philosophical-assumptions/#:~:text=It%20is%20the%20lens%20through,for%20data%20collection%20and%20analysis.&amp;text=Research%20paradigms%20consist%20of%20four,ontology%2C%20epistemology%2C%20and%20methodology.</a:t>
+            </a:r>
+            <a:endParaRPr lang="en-IE" sz="2000" dirty="0">
+              <a:latin typeface="Arial" panose="020B0604020202020204" pitchFamily="34" charset="0"/>
+              <a:cs typeface="Arial" panose="020B0604020202020204" pitchFamily="34" charset="0"/>
+            </a:endParaRPr>
+          </a:p>
+          <a:p>
+            <a:pPr marL="0" indent="0" algn="just" defTabSz="895350">
+              <a:buNone/>
+            </a:pPr>
+            <a:r>
+              <a:rPr lang="en-IE" sz="2000" dirty="0">
+                <a:latin typeface="Arial" panose="020B0604020202020204" pitchFamily="34" charset="0"/>
+                <a:cs typeface="Arial" panose="020B0604020202020204" pitchFamily="34" charset="0"/>
+                <a:hlinkClick r:id="rId4">
+                  <a:extLst>
+                    <a:ext uri="{A12FA001-AC4F-418D-AE19-62706E023703}">
+                      <ahyp:hlinkClr xmlns:ahyp="http://schemas.microsoft.com/office/drawing/2018/hyperlinkcolor" val="tx"/>
+                    </a:ext>
+                  </a:extLst>
+                </a:hlinkClick>
+              </a:rPr>
+              <a:t>https://researcher.life/blog/article/what-is-a-research-paradigm-types-examples/</a:t>
+            </a:r>
+            <a:endParaRPr lang="en-IE" sz="2000" dirty="0">
+              <a:latin typeface="Arial" panose="020B0604020202020204" pitchFamily="34" charset="0"/>
+              <a:cs typeface="Arial" panose="020B0604020202020204" pitchFamily="34" charset="0"/>
+            </a:endParaRPr>
+          </a:p>
+          <a:p>
+            <a:pPr marL="0" indent="0" algn="just" defTabSz="895350">
+              <a:buNone/>
+            </a:pPr>
+            <a:r>
+              <a:rPr lang="en-IE" sz="2000" dirty="0">
                 <a:latin typeface="Arial" panose="020B0604020202020204" pitchFamily="34" charset="0"/>
                 <a:cs typeface="Arial" panose="020B0604020202020204" pitchFamily="34" charset="0"/>
               </a:rPr>
-              <a:t>Bandura, A. (1986). Social Foundations of Thought and Action: Social Cognitive Theory. U.S.A: Pearson Education.</a:t>
+              <a:t>For the coding process some of the examples from the slides of the class  was incorporated and applied on that matter </a:t>
             </a:r>
+          </a:p>
+          <a:p>
+            <a:pPr marL="0" indent="0" algn="just" defTabSz="895350">
+              <a:buNone/>
+            </a:pPr>
+            <a:r>
+              <a:rPr lang="en-IE" sz="2000" dirty="0">
+                <a:latin typeface="Arial" panose="020B0604020202020204" pitchFamily="34" charset="0"/>
+                <a:cs typeface="Arial" panose="020B0604020202020204" pitchFamily="34" charset="0"/>
+                <a:hlinkClick r:id="rId5">
+                  <a:extLst>
+                    <a:ext uri="{A12FA001-AC4F-418D-AE19-62706E023703}">
+                      <ahyp:hlinkClr xmlns:ahyp="http://schemas.microsoft.com/office/drawing/2018/hyperlinkcolor" val="tx"/>
+                    </a:ext>
+                  </a:extLst>
+                </a:hlinkClick>
+              </a:rPr>
+              <a:t>https://www.digitalocean.com/community/tutorials/paste-in-r</a:t>
+            </a:r>
+            <a:endParaRPr lang="en-IE" sz="2000" dirty="0">
+              <a:latin typeface="Arial" panose="020B0604020202020204" pitchFamily="34" charset="0"/>
+              <a:cs typeface="Arial" panose="020B0604020202020204" pitchFamily="34" charset="0"/>
+            </a:endParaRPr>
+          </a:p>
+          <a:p>
+            <a:pPr marL="0" indent="0" algn="just" defTabSz="895350">
+              <a:buNone/>
+            </a:pPr>
+            <a:r>
+              <a:rPr lang="en-IE" sz="2000" dirty="0">
+                <a:latin typeface="Arial" panose="020B0604020202020204" pitchFamily="34" charset="0"/>
+                <a:cs typeface="Arial" panose="020B0604020202020204" pitchFamily="34" charset="0"/>
+              </a:rPr>
+              <a:t>Video: </a:t>
+            </a:r>
+            <a:r>
+              <a:rPr lang="en-IE" sz="2000" dirty="0">
+                <a:latin typeface="Arial" panose="020B0604020202020204" pitchFamily="34" charset="0"/>
+                <a:cs typeface="Arial" panose="020B0604020202020204" pitchFamily="34" charset="0"/>
+                <a:hlinkClick r:id="rId6">
+                  <a:extLst>
+                    <a:ext uri="{A12FA001-AC4F-418D-AE19-62706E023703}">
+                      <ahyp:hlinkClr xmlns:ahyp="http://schemas.microsoft.com/office/drawing/2018/hyperlinkcolor" val="tx"/>
+                    </a:ext>
+                  </a:extLst>
+                </a:hlinkClick>
+              </a:rPr>
+              <a:t>https://drive.google.com/file/d/1l2URIM33dPOjFOXWsl4TpBd-39hMD8YH/view?usp=sharing</a:t>
+            </a:r>
+            <a:endParaRPr lang="en-IE" sz="2000" dirty="0">
+              <a:latin typeface="Arial" panose="020B0604020202020204" pitchFamily="34" charset="0"/>
+              <a:cs typeface="Arial" panose="020B0604020202020204" pitchFamily="34" charset="0"/>
+            </a:endParaRPr>
           </a:p>
           <a:p>
             <a:pPr marL="0" indent="0" algn="just" defTabSz="895350">
@@ -18988,207 +16800,296 @@
               <a:cs typeface="Arial" panose="020B0604020202020204" pitchFamily="34" charset="0"/>
             </a:endParaRPr>
           </a:p>
-          <a:p>
-            <a:pPr marL="0" indent="0" algn="just" defTabSz="895350">
-              <a:buNone/>
-            </a:pPr>
-            <a:r>
-              <a:rPr lang="en-IE" sz="900" dirty="0">
-                <a:latin typeface="Arial" panose="020B0604020202020204" pitchFamily="34" charset="0"/>
-                <a:cs typeface="Arial" panose="020B0604020202020204" pitchFamily="34" charset="0"/>
-              </a:rPr>
-              <a:t>Bandura, A. (2006). Guide for constructing self-efficacy scales. In F. </a:t>
-            </a:r>
-            <a:r>
-              <a:rPr lang="en-IE" sz="900" dirty="0" err="1">
-                <a:latin typeface="Arial" panose="020B0604020202020204" pitchFamily="34" charset="0"/>
-                <a:cs typeface="Arial" panose="020B0604020202020204" pitchFamily="34" charset="0"/>
-              </a:rPr>
-              <a:t>Pajares</a:t>
-            </a:r>
-            <a:r>
-              <a:rPr lang="en-IE" sz="900" dirty="0">
-                <a:latin typeface="Arial" panose="020B0604020202020204" pitchFamily="34" charset="0"/>
-                <a:cs typeface="Arial" panose="020B0604020202020204" pitchFamily="34" charset="0"/>
-              </a:rPr>
-              <a:t>, &amp; T. </a:t>
-            </a:r>
-            <a:r>
-              <a:rPr lang="en-IE" sz="900" dirty="0" err="1">
-                <a:latin typeface="Arial" panose="020B0604020202020204" pitchFamily="34" charset="0"/>
-                <a:cs typeface="Arial" panose="020B0604020202020204" pitchFamily="34" charset="0"/>
-              </a:rPr>
-              <a:t>Urdan</a:t>
-            </a:r>
-            <a:r>
-              <a:rPr lang="en-IE" sz="900" dirty="0">
-                <a:latin typeface="Arial" panose="020B0604020202020204" pitchFamily="34" charset="0"/>
-                <a:cs typeface="Arial" panose="020B0604020202020204" pitchFamily="34" charset="0"/>
-              </a:rPr>
-              <a:t> (Eds.), Adolescence and education: Vol. 5. Self efficacy and adolescence (pp. 307-337). Greenwich, CT: Information Age.</a:t>
-            </a:r>
-          </a:p>
-          <a:p>
-            <a:pPr marL="0" indent="0" algn="just" defTabSz="895350">
-              <a:buNone/>
-            </a:pPr>
-            <a:endParaRPr lang="en-IE" sz="900" dirty="0">
-              <a:latin typeface="Arial" panose="020B0604020202020204" pitchFamily="34" charset="0"/>
-              <a:cs typeface="Arial" panose="020B0604020202020204" pitchFamily="34" charset="0"/>
-            </a:endParaRPr>
-          </a:p>
-          <a:p>
-            <a:pPr marL="0" indent="0" algn="just" defTabSz="895350">
-              <a:buNone/>
-            </a:pPr>
-            <a:r>
-              <a:rPr lang="en-IE" sz="900" dirty="0">
-                <a:latin typeface="Arial" panose="020B0604020202020204" pitchFamily="34" charset="0"/>
-                <a:cs typeface="Arial" panose="020B0604020202020204" pitchFamily="34" charset="0"/>
-              </a:rPr>
-              <a:t>Bogdan, R.C., </a:t>
-            </a:r>
-            <a:r>
-              <a:rPr lang="en-IE" sz="900" dirty="0" err="1">
-                <a:latin typeface="Arial" panose="020B0604020202020204" pitchFamily="34" charset="0"/>
-                <a:cs typeface="Arial" panose="020B0604020202020204" pitchFamily="34" charset="0"/>
-              </a:rPr>
-              <a:t>Biklin</a:t>
-            </a:r>
-            <a:r>
-              <a:rPr lang="en-IE" sz="900" dirty="0">
-                <a:latin typeface="Arial" panose="020B0604020202020204" pitchFamily="34" charset="0"/>
-                <a:cs typeface="Arial" panose="020B0604020202020204" pitchFamily="34" charset="0"/>
-              </a:rPr>
-              <a:t>, S.K. (1998). Qualitative research for education: An introduction to theory and methods. (3rd edition).  Boston: </a:t>
-            </a:r>
-            <a:r>
-              <a:rPr lang="en-IE" sz="900" dirty="0" err="1">
-                <a:latin typeface="Arial" panose="020B0604020202020204" pitchFamily="34" charset="0"/>
-                <a:cs typeface="Arial" panose="020B0604020202020204" pitchFamily="34" charset="0"/>
-              </a:rPr>
-              <a:t>Allyn</a:t>
-            </a:r>
-            <a:r>
-              <a:rPr lang="en-IE" sz="900" dirty="0">
-                <a:latin typeface="Arial" panose="020B0604020202020204" pitchFamily="34" charset="0"/>
-                <a:cs typeface="Arial" panose="020B0604020202020204" pitchFamily="34" charset="0"/>
-              </a:rPr>
-              <a:t> and Bacon.</a:t>
-            </a:r>
-          </a:p>
-          <a:p>
-            <a:pPr marL="0" indent="0" algn="just" defTabSz="895350">
-              <a:buNone/>
-            </a:pPr>
-            <a:endParaRPr lang="en-IE" sz="900" dirty="0">
-              <a:latin typeface="Arial" panose="020B0604020202020204" pitchFamily="34" charset="0"/>
-              <a:cs typeface="Arial" panose="020B0604020202020204" pitchFamily="34" charset="0"/>
-            </a:endParaRPr>
-          </a:p>
-          <a:p>
-            <a:pPr marL="0" indent="0" algn="just" defTabSz="895350">
-              <a:buNone/>
-            </a:pPr>
-            <a:r>
-              <a:rPr lang="en-IE" sz="900" dirty="0">
-                <a:latin typeface="Arial" panose="020B0604020202020204" pitchFamily="34" charset="0"/>
-                <a:cs typeface="Arial" panose="020B0604020202020204" pitchFamily="34" charset="0"/>
-              </a:rPr>
-              <a:t>Bryman, A. (2004). Social Research Methods.  U.K.: Oxford University Press.</a:t>
-            </a:r>
-          </a:p>
-          <a:p>
-            <a:pPr marL="0" indent="0" algn="just" defTabSz="895350">
-              <a:buNone/>
-            </a:pPr>
-            <a:endParaRPr lang="en-IE" sz="900" dirty="0">
-              <a:latin typeface="Arial" panose="020B0604020202020204" pitchFamily="34" charset="0"/>
-              <a:cs typeface="Arial" panose="020B0604020202020204" pitchFamily="34" charset="0"/>
-            </a:endParaRPr>
-          </a:p>
-          <a:p>
-            <a:pPr marL="0" indent="0" algn="just" defTabSz="895350">
-              <a:buNone/>
-            </a:pPr>
-            <a:r>
-              <a:rPr lang="en-IE" sz="900" dirty="0">
-                <a:latin typeface="Arial" panose="020B0604020202020204" pitchFamily="34" charset="0"/>
-                <a:cs typeface="Arial" panose="020B0604020202020204" pitchFamily="34" charset="0"/>
-              </a:rPr>
-              <a:t>Creswell, J.W., Miller, G.A. (1997).  Research Methodologies and Doctoral Process.  New Directions for Higher Education, no.99.  U.S.A.: Wiley.</a:t>
-            </a:r>
-          </a:p>
-          <a:p>
-            <a:pPr marL="0" indent="0" algn="just" defTabSz="895350">
-              <a:buNone/>
-            </a:pPr>
-            <a:endParaRPr lang="en-IE" sz="900" dirty="0">
-              <a:latin typeface="Arial" panose="020B0604020202020204" pitchFamily="34" charset="0"/>
-              <a:cs typeface="Arial" panose="020B0604020202020204" pitchFamily="34" charset="0"/>
-            </a:endParaRPr>
-          </a:p>
-          <a:p>
-            <a:pPr marL="0" indent="0" algn="just" defTabSz="895350">
-              <a:buNone/>
-            </a:pPr>
-            <a:r>
-              <a:rPr lang="en-IE" sz="900" dirty="0">
-                <a:latin typeface="Arial" panose="020B0604020202020204" pitchFamily="34" charset="0"/>
-                <a:cs typeface="Arial" panose="020B0604020202020204" pitchFamily="34" charset="0"/>
-              </a:rPr>
-              <a:t>Hamir, S., </a:t>
-            </a:r>
-            <a:r>
-              <a:rPr lang="en-IE" sz="900" dirty="0" err="1">
-                <a:latin typeface="Arial" panose="020B0604020202020204" pitchFamily="34" charset="0"/>
-                <a:cs typeface="Arial" panose="020B0604020202020204" pitchFamily="34" charset="0"/>
-              </a:rPr>
-              <a:t>Maion</a:t>
-            </a:r>
-            <a:r>
-              <a:rPr lang="en-IE" sz="900" dirty="0">
-                <a:latin typeface="Arial" panose="020B0604020202020204" pitchFamily="34" charset="0"/>
-                <a:cs typeface="Arial" panose="020B0604020202020204" pitchFamily="34" charset="0"/>
-              </a:rPr>
-              <a:t>, S., Tice, S., &amp; Wideman, A. (2015) Constructivism in</a:t>
-            </a:r>
-          </a:p>
-          <a:p>
-            <a:pPr marL="0" indent="0" algn="just" defTabSz="895350">
-              <a:buNone/>
-            </a:pPr>
-            <a:r>
-              <a:rPr lang="en-IE" sz="900" dirty="0">
-                <a:latin typeface="Arial" panose="020B0604020202020204" pitchFamily="34" charset="0"/>
-                <a:cs typeface="Arial" panose="020B0604020202020204" pitchFamily="34" charset="0"/>
-              </a:rPr>
-              <a:t>Education. Available at: http://constructivism512.weebly.com . Accessed 27th February 2018.</a:t>
-            </a:r>
-          </a:p>
-          <a:p>
-            <a:pPr marL="0" indent="0" algn="just" defTabSz="895350">
-              <a:buNone/>
-            </a:pPr>
-            <a:endParaRPr lang="en-IE" sz="900" dirty="0">
-              <a:latin typeface="Arial" panose="020B0604020202020204" pitchFamily="34" charset="0"/>
-              <a:cs typeface="Arial" panose="020B0604020202020204" pitchFamily="34" charset="0"/>
-            </a:endParaRPr>
-          </a:p>
-          <a:p>
-            <a:pPr marL="0" indent="0" algn="just" defTabSz="895350">
-              <a:buNone/>
-            </a:pPr>
-            <a:r>
-              <a:rPr lang="en-IE" sz="900" dirty="0">
-                <a:latin typeface="Arial" panose="020B0604020202020204" pitchFamily="34" charset="0"/>
-                <a:cs typeface="Arial" panose="020B0604020202020204" pitchFamily="34" charset="0"/>
-              </a:rPr>
-              <a:t>Miles, M.B., &amp; Huberman, A.M. (1994). Qualitative data analysis: A sourcebook of new methods.  Thousand Oaks, CA: Sage.</a:t>
-            </a:r>
-          </a:p>
         </p:txBody>
       </p:sp>
+      <p:pic>
+        <p:nvPicPr>
+          <p:cNvPr id="10" name="Picture 9" descr="A diagram of exploratory data analysis&#10;&#10;Description automatically generated">
+            <a:extLst>
+              <a:ext uri="{FF2B5EF4-FFF2-40B4-BE49-F238E27FC236}">
+                <a16:creationId xmlns:a16="http://schemas.microsoft.com/office/drawing/2014/main" id="{B81E4865-28E9-FCC7-1A93-957C23A2E812}"/>
+              </a:ext>
+            </a:extLst>
+          </p:cNvPr>
+          <p:cNvPicPr>
+            <a:picLocks noChangeAspect="1"/>
+          </p:cNvPicPr>
+          <p:nvPr/>
+        </p:nvPicPr>
+        <p:blipFill>
+          <a:blip r:embed="rId7">
+            <a:extLst>
+              <a:ext uri="{28A0092B-C50C-407E-A947-70E740481C1C}">
+                <a14:useLocalDpi xmlns:a14="http://schemas.microsoft.com/office/drawing/2010/main" val="0"/>
+              </a:ext>
+            </a:extLst>
+          </a:blip>
+          <a:stretch>
+            <a:fillRect/>
+          </a:stretch>
+        </p:blipFill>
+        <p:spPr>
+          <a:xfrm>
+            <a:off x="896080" y="22608297"/>
+            <a:ext cx="9102050" cy="7583677"/>
+          </a:xfrm>
+          <a:prstGeom prst="rect">
+            <a:avLst/>
+          </a:prstGeom>
+        </p:spPr>
+      </p:pic>
+      <p:pic>
+        <p:nvPicPr>
+          <p:cNvPr id="13" name="Picture 12" descr="A diagram of a research&#10;&#10;Description automatically generated">
+            <a:extLst>
+              <a:ext uri="{FF2B5EF4-FFF2-40B4-BE49-F238E27FC236}">
+                <a16:creationId xmlns:a16="http://schemas.microsoft.com/office/drawing/2014/main" id="{CB4D98D1-A179-6575-D60B-1FCC7FAD1284}"/>
+              </a:ext>
+            </a:extLst>
+          </p:cNvPr>
+          <p:cNvPicPr>
+            <a:picLocks noChangeAspect="1"/>
+          </p:cNvPicPr>
+          <p:nvPr/>
+        </p:nvPicPr>
+        <p:blipFill>
+          <a:blip r:embed="rId8">
+            <a:extLst>
+              <a:ext uri="{28A0092B-C50C-407E-A947-70E740481C1C}">
+                <a14:useLocalDpi xmlns:a14="http://schemas.microsoft.com/office/drawing/2010/main" val="0"/>
+              </a:ext>
+            </a:extLst>
+          </a:blip>
+          <a:stretch>
+            <a:fillRect/>
+          </a:stretch>
+        </p:blipFill>
+        <p:spPr>
+          <a:xfrm>
+            <a:off x="11876133" y="9574970"/>
+            <a:ext cx="8978030" cy="6688027"/>
+          </a:xfrm>
+          <a:prstGeom prst="rect">
+            <a:avLst/>
+          </a:prstGeom>
+        </p:spPr>
+      </p:pic>
+      <p:pic>
+        <p:nvPicPr>
+          <p:cNvPr id="24" name="Picture 23" descr="A close-up of a white background&#10;&#10;Description automatically generated">
+            <a:extLst>
+              <a:ext uri="{FF2B5EF4-FFF2-40B4-BE49-F238E27FC236}">
+                <a16:creationId xmlns:a16="http://schemas.microsoft.com/office/drawing/2014/main" id="{0E8C4C74-5E0D-E5E6-EA7E-2BB6593787BE}"/>
+              </a:ext>
+            </a:extLst>
+          </p:cNvPr>
+          <p:cNvPicPr>
+            <a:picLocks noChangeAspect="1"/>
+          </p:cNvPicPr>
+          <p:nvPr/>
+        </p:nvPicPr>
+        <p:blipFill>
+          <a:blip r:embed="rId9">
+            <a:extLst>
+              <a:ext uri="{28A0092B-C50C-407E-A947-70E740481C1C}">
+                <a14:useLocalDpi xmlns:a14="http://schemas.microsoft.com/office/drawing/2010/main" val="0"/>
+              </a:ext>
+            </a:extLst>
+          </a:blip>
+          <a:stretch>
+            <a:fillRect/>
+          </a:stretch>
+        </p:blipFill>
+        <p:spPr>
+          <a:xfrm>
+            <a:off x="11876134" y="26929729"/>
+            <a:ext cx="9334330" cy="4656833"/>
+          </a:xfrm>
+          <a:prstGeom prst="rect">
+            <a:avLst/>
+          </a:prstGeom>
+        </p:spPr>
+      </p:pic>
+      <p:pic>
+        <p:nvPicPr>
+          <p:cNvPr id="44" name="Picture 43" descr="A graph showing a red rectangle and black dots&#10;&#10;Description automatically generated">
+            <a:extLst>
+              <a:ext uri="{FF2B5EF4-FFF2-40B4-BE49-F238E27FC236}">
+                <a16:creationId xmlns:a16="http://schemas.microsoft.com/office/drawing/2014/main" id="{F0ED8C99-6871-BD0C-9C1F-4F4C919D1BFD}"/>
+              </a:ext>
+            </a:extLst>
+          </p:cNvPr>
+          <p:cNvPicPr>
+            <a:picLocks noChangeAspect="1"/>
+          </p:cNvPicPr>
+          <p:nvPr/>
+        </p:nvPicPr>
+        <p:blipFill>
+          <a:blip r:embed="rId10">
+            <a:extLst>
+              <a:ext uri="{28A0092B-C50C-407E-A947-70E740481C1C}">
+                <a14:useLocalDpi xmlns:a14="http://schemas.microsoft.com/office/drawing/2010/main" val="0"/>
+              </a:ext>
+            </a:extLst>
+          </a:blip>
+          <a:stretch>
+            <a:fillRect/>
+          </a:stretch>
+        </p:blipFill>
+        <p:spPr>
+          <a:xfrm>
+            <a:off x="11876133" y="19854360"/>
+            <a:ext cx="8978029" cy="5533902"/>
+          </a:xfrm>
+          <a:prstGeom prst="rect">
+            <a:avLst/>
+          </a:prstGeom>
+        </p:spPr>
+      </p:pic>
+      <p:pic>
+        <p:nvPicPr>
+          <p:cNvPr id="53" name="Picture 52" descr="A white grid with black text&#10;&#10;Description automatically generated">
+            <a:extLst>
+              <a:ext uri="{FF2B5EF4-FFF2-40B4-BE49-F238E27FC236}">
+                <a16:creationId xmlns:a16="http://schemas.microsoft.com/office/drawing/2014/main" id="{2DEEF993-62EF-66A6-104D-C27E3887768A}"/>
+              </a:ext>
+            </a:extLst>
+          </p:cNvPr>
+          <p:cNvPicPr>
+            <a:picLocks noChangeAspect="1"/>
+          </p:cNvPicPr>
+          <p:nvPr/>
+        </p:nvPicPr>
+        <p:blipFill>
+          <a:blip r:embed="rId11">
+            <a:extLst>
+              <a:ext uri="{28A0092B-C50C-407E-A947-70E740481C1C}">
+                <a14:useLocalDpi xmlns:a14="http://schemas.microsoft.com/office/drawing/2010/main" val="0"/>
+              </a:ext>
+            </a:extLst>
+          </a:blip>
+          <a:stretch>
+            <a:fillRect/>
+          </a:stretch>
+        </p:blipFill>
+        <p:spPr>
+          <a:xfrm>
+            <a:off x="22809542" y="10934150"/>
+            <a:ext cx="8978030" cy="5154252"/>
+          </a:xfrm>
+          <a:prstGeom prst="rect">
+            <a:avLst/>
+          </a:prstGeom>
+        </p:spPr>
+      </p:pic>
+      <p:pic>
+        <p:nvPicPr>
+          <p:cNvPr id="55" name="Picture 54" descr="A graph with blue rectangular bars&#10;&#10;Description automatically generated with medium confidence">
+            <a:extLst>
+              <a:ext uri="{FF2B5EF4-FFF2-40B4-BE49-F238E27FC236}">
+                <a16:creationId xmlns:a16="http://schemas.microsoft.com/office/drawing/2014/main" id="{ED6C24B7-3A9F-2FBA-94A7-086C764A2F0A}"/>
+              </a:ext>
+            </a:extLst>
+          </p:cNvPr>
+          <p:cNvPicPr>
+            <a:picLocks noChangeAspect="1"/>
+          </p:cNvPicPr>
+          <p:nvPr/>
+        </p:nvPicPr>
+        <p:blipFill>
+          <a:blip r:embed="rId12">
+            <a:extLst>
+              <a:ext uri="{28A0092B-C50C-407E-A947-70E740481C1C}">
+                <a14:useLocalDpi xmlns:a14="http://schemas.microsoft.com/office/drawing/2010/main" val="0"/>
+              </a:ext>
+            </a:extLst>
+          </a:blip>
+          <a:stretch>
+            <a:fillRect/>
+          </a:stretch>
+        </p:blipFill>
+        <p:spPr>
+          <a:xfrm>
+            <a:off x="22670286" y="18763658"/>
+            <a:ext cx="9256541" cy="6394928"/>
+          </a:xfrm>
+          <a:prstGeom prst="rect">
+            <a:avLst/>
+          </a:prstGeom>
+        </p:spPr>
+      </p:pic>
+      <p:pic>
+        <p:nvPicPr>
+          <p:cNvPr id="59" name="Picture 58" descr="A computer code with numbers and letters&#10;&#10;Description automatically generated">
+            <a:extLst>
+              <a:ext uri="{FF2B5EF4-FFF2-40B4-BE49-F238E27FC236}">
+                <a16:creationId xmlns:a16="http://schemas.microsoft.com/office/drawing/2014/main" id="{CCDD611E-1E17-AEEB-428C-E7ED4AEB8CE5}"/>
+              </a:ext>
+            </a:extLst>
+          </p:cNvPr>
+          <p:cNvPicPr>
+            <a:picLocks noChangeAspect="1"/>
+          </p:cNvPicPr>
+          <p:nvPr/>
+        </p:nvPicPr>
+        <p:blipFill>
+          <a:blip r:embed="rId13">
+            <a:extLst>
+              <a:ext uri="{28A0092B-C50C-407E-A947-70E740481C1C}">
+                <a14:useLocalDpi xmlns:a14="http://schemas.microsoft.com/office/drawing/2010/main" val="0"/>
+              </a:ext>
+            </a:extLst>
+          </a:blip>
+          <a:stretch>
+            <a:fillRect/>
+          </a:stretch>
+        </p:blipFill>
+        <p:spPr>
+          <a:xfrm>
+            <a:off x="22670286" y="28031690"/>
+            <a:ext cx="9211241" cy="3081818"/>
+          </a:xfrm>
+          <a:prstGeom prst="rect">
+            <a:avLst/>
+          </a:prstGeom>
+        </p:spPr>
+      </p:pic>
+      <p:pic>
+        <p:nvPicPr>
+          <p:cNvPr id="61" name="Picture 60" descr="A screenshot of a computer&#10;&#10;Description automatically generated">
+            <a:extLst>
+              <a:ext uri="{FF2B5EF4-FFF2-40B4-BE49-F238E27FC236}">
+                <a16:creationId xmlns:a16="http://schemas.microsoft.com/office/drawing/2014/main" id="{1A7CD32C-38A8-FF4C-0200-10CB533530A9}"/>
+              </a:ext>
+            </a:extLst>
+          </p:cNvPr>
+          <p:cNvPicPr>
+            <a:picLocks noChangeAspect="1"/>
+          </p:cNvPicPr>
+          <p:nvPr/>
+        </p:nvPicPr>
+        <p:blipFill>
+          <a:blip r:embed="rId14">
+            <a:extLst>
+              <a:ext uri="{28A0092B-C50C-407E-A947-70E740481C1C}">
+                <a14:useLocalDpi xmlns:a14="http://schemas.microsoft.com/office/drawing/2010/main" val="0"/>
+              </a:ext>
+            </a:extLst>
+          </a:blip>
+          <a:stretch>
+            <a:fillRect/>
+          </a:stretch>
+        </p:blipFill>
+        <p:spPr>
+          <a:xfrm>
+            <a:off x="34009536" y="8605129"/>
+            <a:ext cx="8978030" cy="4734295"/>
+          </a:xfrm>
+          <a:prstGeom prst="rect">
+            <a:avLst/>
+          </a:prstGeom>
+        </p:spPr>
+      </p:pic>
     </p:spTree>
     <p:extLst>
       <p:ext uri="{BB962C8B-B14F-4D97-AF65-F5344CB8AC3E}">

</xml_diff>